<commit_message>
updated document and presentation to final form
</commit_message>
<xml_diff>
--- a/VisualizationofNucleation.pptx
+++ b/VisualizationofNucleation.pptx
@@ -13,17 +13,18 @@
     <p:sldId id="261" r:id="rId7"/>
     <p:sldId id="270" r:id="rId8"/>
     <p:sldId id="262" r:id="rId9"/>
-    <p:sldId id="271" r:id="rId10"/>
-    <p:sldId id="263" r:id="rId11"/>
-    <p:sldId id="264" r:id="rId12"/>
-    <p:sldId id="265" r:id="rId13"/>
-    <p:sldId id="266" r:id="rId14"/>
-    <p:sldId id="267" r:id="rId15"/>
-    <p:sldId id="274" r:id="rId16"/>
-    <p:sldId id="272" r:id="rId17"/>
-    <p:sldId id="268" r:id="rId18"/>
-    <p:sldId id="273" r:id="rId19"/>
-    <p:sldId id="269" r:id="rId20"/>
+    <p:sldId id="275" r:id="rId10"/>
+    <p:sldId id="271" r:id="rId11"/>
+    <p:sldId id="263" r:id="rId12"/>
+    <p:sldId id="264" r:id="rId13"/>
+    <p:sldId id="265" r:id="rId14"/>
+    <p:sldId id="266" r:id="rId15"/>
+    <p:sldId id="267" r:id="rId16"/>
+    <p:sldId id="274" r:id="rId17"/>
+    <p:sldId id="272" r:id="rId18"/>
+    <p:sldId id="268" r:id="rId19"/>
+    <p:sldId id="273" r:id="rId20"/>
+    <p:sldId id="269" r:id="rId21"/>
   </p:sldIdLst>
   <p:sldSz cx="12192000" cy="6858000"/>
   <p:notesSz cx="6858000" cy="9144000"/>
@@ -259,7 +260,7 @@
           <a:p>
             <a:fld id="{5433BE24-E7BF-4C3E-BF78-9DB625FFD802}" type="datetimeFigureOut">
               <a:rPr lang="en-US" smtClean="0"/>
-              <a:t>12/7/2016</a:t>
+              <a:t>12/8/2016</a:t>
             </a:fld>
             <a:endParaRPr lang="en-US"/>
           </a:p>
@@ -427,7 +428,7 @@
           <a:p>
             <a:fld id="{5433BE24-E7BF-4C3E-BF78-9DB625FFD802}" type="datetimeFigureOut">
               <a:rPr lang="en-US" smtClean="0"/>
-              <a:t>12/7/2016</a:t>
+              <a:t>12/8/2016</a:t>
             </a:fld>
             <a:endParaRPr lang="en-US"/>
           </a:p>
@@ -605,7 +606,7 @@
           <a:p>
             <a:fld id="{5433BE24-E7BF-4C3E-BF78-9DB625FFD802}" type="datetimeFigureOut">
               <a:rPr lang="en-US" smtClean="0"/>
-              <a:t>12/7/2016</a:t>
+              <a:t>12/8/2016</a:t>
             </a:fld>
             <a:endParaRPr lang="en-US"/>
           </a:p>
@@ -773,7 +774,7 @@
           <a:p>
             <a:fld id="{5433BE24-E7BF-4C3E-BF78-9DB625FFD802}" type="datetimeFigureOut">
               <a:rPr lang="en-US" smtClean="0"/>
-              <a:t>12/7/2016</a:t>
+              <a:t>12/8/2016</a:t>
             </a:fld>
             <a:endParaRPr lang="en-US"/>
           </a:p>
@@ -1018,7 +1019,7 @@
           <a:p>
             <a:fld id="{5433BE24-E7BF-4C3E-BF78-9DB625FFD802}" type="datetimeFigureOut">
               <a:rPr lang="en-US" smtClean="0"/>
-              <a:t>12/7/2016</a:t>
+              <a:t>12/8/2016</a:t>
             </a:fld>
             <a:endParaRPr lang="en-US"/>
           </a:p>
@@ -1247,7 +1248,7 @@
           <a:p>
             <a:fld id="{5433BE24-E7BF-4C3E-BF78-9DB625FFD802}" type="datetimeFigureOut">
               <a:rPr lang="en-US" smtClean="0"/>
-              <a:t>12/7/2016</a:t>
+              <a:t>12/8/2016</a:t>
             </a:fld>
             <a:endParaRPr lang="en-US"/>
           </a:p>
@@ -1611,7 +1612,7 @@
           <a:p>
             <a:fld id="{5433BE24-E7BF-4C3E-BF78-9DB625FFD802}" type="datetimeFigureOut">
               <a:rPr lang="en-US" smtClean="0"/>
-              <a:t>12/7/2016</a:t>
+              <a:t>12/8/2016</a:t>
             </a:fld>
             <a:endParaRPr lang="en-US"/>
           </a:p>
@@ -1728,7 +1729,7 @@
           <a:p>
             <a:fld id="{5433BE24-E7BF-4C3E-BF78-9DB625FFD802}" type="datetimeFigureOut">
               <a:rPr lang="en-US" smtClean="0"/>
-              <a:t>12/7/2016</a:t>
+              <a:t>12/8/2016</a:t>
             </a:fld>
             <a:endParaRPr lang="en-US"/>
           </a:p>
@@ -1823,7 +1824,7 @@
           <a:p>
             <a:fld id="{5433BE24-E7BF-4C3E-BF78-9DB625FFD802}" type="datetimeFigureOut">
               <a:rPr lang="en-US" smtClean="0"/>
-              <a:t>12/7/2016</a:t>
+              <a:t>12/8/2016</a:t>
             </a:fld>
             <a:endParaRPr lang="en-US"/>
           </a:p>
@@ -2098,7 +2099,7 @@
           <a:p>
             <a:fld id="{5433BE24-E7BF-4C3E-BF78-9DB625FFD802}" type="datetimeFigureOut">
               <a:rPr lang="en-US" smtClean="0"/>
-              <a:t>12/7/2016</a:t>
+              <a:t>12/8/2016</a:t>
             </a:fld>
             <a:endParaRPr lang="en-US"/>
           </a:p>
@@ -2350,7 +2351,7 @@
           <a:p>
             <a:fld id="{5433BE24-E7BF-4C3E-BF78-9DB625FFD802}" type="datetimeFigureOut">
               <a:rPr lang="en-US" smtClean="0"/>
-              <a:t>12/7/2016</a:t>
+              <a:t>12/8/2016</a:t>
             </a:fld>
             <a:endParaRPr lang="en-US"/>
           </a:p>
@@ -2561,7 +2562,7 @@
           <a:p>
             <a:fld id="{5433BE24-E7BF-4C3E-BF78-9DB625FFD802}" type="datetimeFigureOut">
               <a:rPr lang="en-US" smtClean="0"/>
-              <a:t>12/7/2016</a:t>
+              <a:t>12/8/2016</a:t>
             </a:fld>
             <a:endParaRPr lang="en-US"/>
           </a:p>
@@ -2976,7 +2977,12 @@
             <p:ph type="ctrTitle"/>
           </p:nvPr>
         </p:nvSpPr>
-        <p:spPr/>
+        <p:spPr>
+          <a:xfrm>
+            <a:off x="1524000" y="723900"/>
+            <a:ext cx="9144000" cy="1347788"/>
+          </a:xfrm>
+        </p:spPr>
         <p:txBody>
           <a:bodyPr>
             <a:normAutofit/>
@@ -3000,7 +3006,12 @@
             <p:ph type="subTitle" idx="1"/>
           </p:nvPr>
         </p:nvSpPr>
-        <p:spPr/>
+        <p:spPr>
+          <a:xfrm>
+            <a:off x="1524000" y="2249488"/>
+            <a:ext cx="9144000" cy="1655762"/>
+          </a:xfrm>
+        </p:spPr>
         <p:txBody>
           <a:bodyPr/>
           <a:lstStyle/>
@@ -3012,6 +3023,36 @@
           </a:p>
         </p:txBody>
       </p:sp>
+      <p:pic>
+        <p:nvPicPr>
+          <p:cNvPr id="4" name="Picture 3"/>
+          <p:cNvPicPr>
+            <a:picLocks noChangeAspect="1"/>
+          </p:cNvPicPr>
+          <p:nvPr/>
+        </p:nvPicPr>
+        <p:blipFill>
+          <a:blip r:embed="rId2">
+            <a:extLst>
+              <a:ext uri="{28A0092B-C50C-407E-A947-70E740481C1C}">
+                <a14:useLocalDpi xmlns:a14="http://schemas.microsoft.com/office/drawing/2010/main" val="0"/>
+              </a:ext>
+            </a:extLst>
+          </a:blip>
+          <a:stretch>
+            <a:fillRect/>
+          </a:stretch>
+        </p:blipFill>
+        <p:spPr>
+          <a:xfrm>
+            <a:off x="3876675" y="3305175"/>
+            <a:ext cx="4572000" cy="3048000"/>
+          </a:xfrm>
+          <a:prstGeom prst="rect">
+            <a:avLst/>
+          </a:prstGeom>
+        </p:spPr>
+      </p:pic>
     </p:spTree>
     <p:extLst>
       <p:ext uri="{BB962C8B-B14F-4D97-AF65-F5344CB8AC3E}">
@@ -3026,6 +3067,1226 @@
 </file>
 
 <file path=ppt/slides/slide10.xml><?xml version="1.0" encoding="utf-8"?>
+<p:sld xmlns:a="http://schemas.openxmlformats.org/drawingml/2006/main" xmlns:r="http://schemas.openxmlformats.org/officeDocument/2006/relationships" xmlns:p="http://schemas.openxmlformats.org/presentationml/2006/main">
+  <p:cSld>
+    <p:spTree>
+      <p:nvGrpSpPr>
+        <p:cNvPr id="1" name=""/>
+        <p:cNvGrpSpPr/>
+        <p:nvPr/>
+      </p:nvGrpSpPr>
+      <p:grpSpPr>
+        <a:xfrm>
+          <a:off x="0" y="0"/>
+          <a:ext cx="0" cy="0"/>
+          <a:chOff x="0" y="0"/>
+          <a:chExt cx="0" cy="0"/>
+        </a:xfrm>
+      </p:grpSpPr>
+      <p:sp>
+        <p:nvSpPr>
+          <p:cNvPr id="28" name="Rectangle 27"/>
+          <p:cNvSpPr/>
+          <p:nvPr/>
+        </p:nvSpPr>
+        <p:spPr>
+          <a:xfrm>
+            <a:off x="1715588" y="1613875"/>
+            <a:ext cx="9283337" cy="4743381"/>
+          </a:xfrm>
+          <a:prstGeom prst="rect">
+            <a:avLst/>
+          </a:prstGeom>
+        </p:spPr>
+        <p:style>
+          <a:lnRef idx="2">
+            <a:schemeClr val="accent2">
+              <a:shade val="50000"/>
+            </a:schemeClr>
+          </a:lnRef>
+          <a:fillRef idx="1">
+            <a:schemeClr val="accent2"/>
+          </a:fillRef>
+          <a:effectRef idx="0">
+            <a:schemeClr val="accent2"/>
+          </a:effectRef>
+          <a:fontRef idx="minor">
+            <a:schemeClr val="lt1"/>
+          </a:fontRef>
+        </p:style>
+        <p:txBody>
+          <a:bodyPr rtlCol="0" anchor="ctr"/>
+          <a:lstStyle/>
+          <a:p>
+            <a:pPr algn="ctr"/>
+            <a:endParaRPr lang="en-US"/>
+          </a:p>
+        </p:txBody>
+      </p:sp>
+      <p:sp>
+        <p:nvSpPr>
+          <p:cNvPr id="2" name="Title 1"/>
+          <p:cNvSpPr>
+            <a:spLocks noGrp="1"/>
+          </p:cNvSpPr>
+          <p:nvPr>
+            <p:ph type="title"/>
+          </p:nvPr>
+        </p:nvSpPr>
+        <p:spPr/>
+        <p:txBody>
+          <a:bodyPr/>
+          <a:lstStyle/>
+          <a:p>
+            <a:r>
+              <a:rPr lang="en-US" dirty="0"/>
+              <a:t>Software Design: Objects</a:t>
+            </a:r>
+          </a:p>
+        </p:txBody>
+      </p:sp>
+      <p:sp>
+        <p:nvSpPr>
+          <p:cNvPr id="4" name="Flowchart: Connector 3"/>
+          <p:cNvSpPr/>
+          <p:nvPr/>
+        </p:nvSpPr>
+        <p:spPr>
+          <a:xfrm>
+            <a:off x="3477395" y="3325112"/>
+            <a:ext cx="457200" cy="457200"/>
+          </a:xfrm>
+          <a:prstGeom prst="flowChartConnector">
+            <a:avLst/>
+          </a:prstGeom>
+        </p:spPr>
+        <p:style>
+          <a:lnRef idx="2">
+            <a:schemeClr val="accent1">
+              <a:shade val="50000"/>
+            </a:schemeClr>
+          </a:lnRef>
+          <a:fillRef idx="1">
+            <a:schemeClr val="accent1"/>
+          </a:fillRef>
+          <a:effectRef idx="0">
+            <a:schemeClr val="accent1"/>
+          </a:effectRef>
+          <a:fontRef idx="minor">
+            <a:schemeClr val="lt1"/>
+          </a:fontRef>
+        </p:style>
+        <p:txBody>
+          <a:bodyPr rtlCol="0" anchor="ctr"/>
+          <a:lstStyle/>
+          <a:p>
+            <a:pPr algn="ctr"/>
+            <a:endParaRPr lang="en-US"/>
+          </a:p>
+        </p:txBody>
+      </p:sp>
+      <p:sp>
+        <p:nvSpPr>
+          <p:cNvPr id="5" name="Flowchart: Connector 4"/>
+          <p:cNvSpPr/>
+          <p:nvPr/>
+        </p:nvSpPr>
+        <p:spPr>
+          <a:xfrm>
+            <a:off x="7180218" y="3409407"/>
+            <a:ext cx="457200" cy="457200"/>
+          </a:xfrm>
+          <a:prstGeom prst="flowChartConnector">
+            <a:avLst/>
+          </a:prstGeom>
+        </p:spPr>
+        <p:style>
+          <a:lnRef idx="2">
+            <a:schemeClr val="accent1">
+              <a:shade val="50000"/>
+            </a:schemeClr>
+          </a:lnRef>
+          <a:fillRef idx="1">
+            <a:schemeClr val="accent1"/>
+          </a:fillRef>
+          <a:effectRef idx="0">
+            <a:schemeClr val="accent1"/>
+          </a:effectRef>
+          <a:fontRef idx="minor">
+            <a:schemeClr val="lt1"/>
+          </a:fontRef>
+        </p:style>
+        <p:txBody>
+          <a:bodyPr rtlCol="0" anchor="ctr"/>
+          <a:lstStyle/>
+          <a:p>
+            <a:pPr algn="ctr"/>
+            <a:endParaRPr lang="en-US"/>
+          </a:p>
+        </p:txBody>
+      </p:sp>
+      <p:sp>
+        <p:nvSpPr>
+          <p:cNvPr id="6" name="Flowchart: Connector 5"/>
+          <p:cNvSpPr/>
+          <p:nvPr/>
+        </p:nvSpPr>
+        <p:spPr>
+          <a:xfrm>
+            <a:off x="7559041" y="3063854"/>
+            <a:ext cx="457200" cy="457200"/>
+          </a:xfrm>
+          <a:prstGeom prst="flowChartConnector">
+            <a:avLst/>
+          </a:prstGeom>
+        </p:spPr>
+        <p:style>
+          <a:lnRef idx="2">
+            <a:schemeClr val="accent1">
+              <a:shade val="50000"/>
+            </a:schemeClr>
+          </a:lnRef>
+          <a:fillRef idx="1">
+            <a:schemeClr val="accent1"/>
+          </a:fillRef>
+          <a:effectRef idx="0">
+            <a:schemeClr val="accent1"/>
+          </a:effectRef>
+          <a:fontRef idx="minor">
+            <a:schemeClr val="lt1"/>
+          </a:fontRef>
+        </p:style>
+        <p:txBody>
+          <a:bodyPr rtlCol="0" anchor="ctr"/>
+          <a:lstStyle/>
+          <a:p>
+            <a:pPr algn="ctr"/>
+            <a:endParaRPr lang="en-US"/>
+          </a:p>
+        </p:txBody>
+      </p:sp>
+      <p:sp>
+        <p:nvSpPr>
+          <p:cNvPr id="7" name="Flowchart: Connector 6"/>
+          <p:cNvSpPr/>
+          <p:nvPr/>
+        </p:nvSpPr>
+        <p:spPr>
+          <a:xfrm>
+            <a:off x="7637418" y="3553712"/>
+            <a:ext cx="457200" cy="457200"/>
+          </a:xfrm>
+          <a:prstGeom prst="flowChartConnector">
+            <a:avLst/>
+          </a:prstGeom>
+        </p:spPr>
+        <p:style>
+          <a:lnRef idx="2">
+            <a:schemeClr val="accent1">
+              <a:shade val="50000"/>
+            </a:schemeClr>
+          </a:lnRef>
+          <a:fillRef idx="1">
+            <a:schemeClr val="accent1"/>
+          </a:fillRef>
+          <a:effectRef idx="0">
+            <a:schemeClr val="accent1"/>
+          </a:effectRef>
+          <a:fontRef idx="minor">
+            <a:schemeClr val="lt1"/>
+          </a:fontRef>
+        </p:style>
+        <p:txBody>
+          <a:bodyPr rtlCol="0" anchor="ctr"/>
+          <a:lstStyle/>
+          <a:p>
+            <a:pPr algn="ctr"/>
+            <a:endParaRPr lang="en-US"/>
+          </a:p>
+        </p:txBody>
+      </p:sp>
+      <p:sp>
+        <p:nvSpPr>
+          <p:cNvPr id="8" name="Flowchart: Connector 7"/>
+          <p:cNvSpPr/>
+          <p:nvPr/>
+        </p:nvSpPr>
+        <p:spPr>
+          <a:xfrm>
+            <a:off x="8016241" y="3281570"/>
+            <a:ext cx="457200" cy="457200"/>
+          </a:xfrm>
+          <a:prstGeom prst="flowChartConnector">
+            <a:avLst/>
+          </a:prstGeom>
+        </p:spPr>
+        <p:style>
+          <a:lnRef idx="2">
+            <a:schemeClr val="accent1">
+              <a:shade val="50000"/>
+            </a:schemeClr>
+          </a:lnRef>
+          <a:fillRef idx="1">
+            <a:schemeClr val="accent1"/>
+          </a:fillRef>
+          <a:effectRef idx="0">
+            <a:schemeClr val="accent1"/>
+          </a:effectRef>
+          <a:fontRef idx="minor">
+            <a:schemeClr val="lt1"/>
+          </a:fontRef>
+        </p:style>
+        <p:txBody>
+          <a:bodyPr rtlCol="0" anchor="ctr"/>
+          <a:lstStyle/>
+          <a:p>
+            <a:pPr algn="ctr"/>
+            <a:endParaRPr lang="en-US"/>
+          </a:p>
+        </p:txBody>
+      </p:sp>
+      <p:sp>
+        <p:nvSpPr>
+          <p:cNvPr id="9" name="Flowchart: Connector 8"/>
+          <p:cNvSpPr/>
+          <p:nvPr/>
+        </p:nvSpPr>
+        <p:spPr>
+          <a:xfrm>
+            <a:off x="8473441" y="3454793"/>
+            <a:ext cx="457200" cy="457200"/>
+          </a:xfrm>
+          <a:prstGeom prst="flowChartConnector">
+            <a:avLst/>
+          </a:prstGeom>
+        </p:spPr>
+        <p:style>
+          <a:lnRef idx="2">
+            <a:schemeClr val="accent1">
+              <a:shade val="50000"/>
+            </a:schemeClr>
+          </a:lnRef>
+          <a:fillRef idx="1">
+            <a:schemeClr val="accent1"/>
+          </a:fillRef>
+          <a:effectRef idx="0">
+            <a:schemeClr val="accent1"/>
+          </a:effectRef>
+          <a:fontRef idx="minor">
+            <a:schemeClr val="lt1"/>
+          </a:fontRef>
+        </p:style>
+        <p:txBody>
+          <a:bodyPr rtlCol="0" anchor="ctr"/>
+          <a:lstStyle/>
+          <a:p>
+            <a:pPr algn="ctr"/>
+            <a:endParaRPr lang="en-US"/>
+          </a:p>
+        </p:txBody>
+      </p:sp>
+      <p:sp>
+        <p:nvSpPr>
+          <p:cNvPr id="10" name="Flowchart: Connector 9"/>
+          <p:cNvSpPr/>
+          <p:nvPr/>
+        </p:nvSpPr>
+        <p:spPr>
+          <a:xfrm>
+            <a:off x="8512629" y="3989631"/>
+            <a:ext cx="457200" cy="457200"/>
+          </a:xfrm>
+          <a:prstGeom prst="flowChartConnector">
+            <a:avLst/>
+          </a:prstGeom>
+        </p:spPr>
+        <p:style>
+          <a:lnRef idx="2">
+            <a:schemeClr val="accent1">
+              <a:shade val="50000"/>
+            </a:schemeClr>
+          </a:lnRef>
+          <a:fillRef idx="1">
+            <a:schemeClr val="accent1"/>
+          </a:fillRef>
+          <a:effectRef idx="0">
+            <a:schemeClr val="accent1"/>
+          </a:effectRef>
+          <a:fontRef idx="minor">
+            <a:schemeClr val="lt1"/>
+          </a:fontRef>
+        </p:style>
+        <p:txBody>
+          <a:bodyPr rtlCol="0" anchor="ctr"/>
+          <a:lstStyle/>
+          <a:p>
+            <a:pPr algn="ctr"/>
+            <a:endParaRPr lang="en-US"/>
+          </a:p>
+        </p:txBody>
+      </p:sp>
+      <p:sp>
+        <p:nvSpPr>
+          <p:cNvPr id="11" name="Flowchart: Connector 10"/>
+          <p:cNvSpPr/>
+          <p:nvPr/>
+        </p:nvSpPr>
+        <p:spPr>
+          <a:xfrm>
+            <a:off x="8122923" y="4296164"/>
+            <a:ext cx="457200" cy="457200"/>
+          </a:xfrm>
+          <a:prstGeom prst="flowChartConnector">
+            <a:avLst/>
+          </a:prstGeom>
+        </p:spPr>
+        <p:style>
+          <a:lnRef idx="2">
+            <a:schemeClr val="accent1">
+              <a:shade val="50000"/>
+            </a:schemeClr>
+          </a:lnRef>
+          <a:fillRef idx="1">
+            <a:schemeClr val="accent1"/>
+          </a:fillRef>
+          <a:effectRef idx="0">
+            <a:schemeClr val="accent1"/>
+          </a:effectRef>
+          <a:fontRef idx="minor">
+            <a:schemeClr val="lt1"/>
+          </a:fontRef>
+        </p:style>
+        <p:txBody>
+          <a:bodyPr rtlCol="0" anchor="ctr"/>
+          <a:lstStyle/>
+          <a:p>
+            <a:pPr algn="ctr"/>
+            <a:endParaRPr lang="en-US"/>
+          </a:p>
+        </p:txBody>
+      </p:sp>
+      <p:sp>
+        <p:nvSpPr>
+          <p:cNvPr id="12" name="Flowchart: Connector 11"/>
+          <p:cNvSpPr/>
+          <p:nvPr/>
+        </p:nvSpPr>
+        <p:spPr>
+          <a:xfrm>
+            <a:off x="8094618" y="3755261"/>
+            <a:ext cx="457200" cy="457200"/>
+          </a:xfrm>
+          <a:prstGeom prst="flowChartConnector">
+            <a:avLst/>
+          </a:prstGeom>
+        </p:spPr>
+        <p:style>
+          <a:lnRef idx="2">
+            <a:schemeClr val="accent1">
+              <a:shade val="50000"/>
+            </a:schemeClr>
+          </a:lnRef>
+          <a:fillRef idx="1">
+            <a:schemeClr val="accent1"/>
+          </a:fillRef>
+          <a:effectRef idx="0">
+            <a:schemeClr val="accent1"/>
+          </a:effectRef>
+          <a:fontRef idx="minor">
+            <a:schemeClr val="lt1"/>
+          </a:fontRef>
+        </p:style>
+        <p:txBody>
+          <a:bodyPr rtlCol="0" anchor="ctr"/>
+          <a:lstStyle/>
+          <a:p>
+            <a:pPr algn="ctr"/>
+            <a:endParaRPr lang="en-US"/>
+          </a:p>
+        </p:txBody>
+      </p:sp>
+      <p:sp>
+        <p:nvSpPr>
+          <p:cNvPr id="13" name="Flowchart: Connector 12"/>
+          <p:cNvSpPr/>
+          <p:nvPr/>
+        </p:nvSpPr>
+        <p:spPr>
+          <a:xfrm>
+            <a:off x="7715795" y="4039238"/>
+            <a:ext cx="457200" cy="457200"/>
+          </a:xfrm>
+          <a:prstGeom prst="flowChartConnector">
+            <a:avLst/>
+          </a:prstGeom>
+        </p:spPr>
+        <p:style>
+          <a:lnRef idx="2">
+            <a:schemeClr val="accent1">
+              <a:shade val="50000"/>
+            </a:schemeClr>
+          </a:lnRef>
+          <a:fillRef idx="1">
+            <a:schemeClr val="accent1"/>
+          </a:fillRef>
+          <a:effectRef idx="0">
+            <a:schemeClr val="accent1"/>
+          </a:effectRef>
+          <a:fontRef idx="minor">
+            <a:schemeClr val="lt1"/>
+          </a:fontRef>
+        </p:style>
+        <p:txBody>
+          <a:bodyPr rtlCol="0" anchor="ctr"/>
+          <a:lstStyle/>
+          <a:p>
+            <a:pPr algn="ctr"/>
+            <a:endParaRPr lang="en-US"/>
+          </a:p>
+        </p:txBody>
+      </p:sp>
+      <p:sp>
+        <p:nvSpPr>
+          <p:cNvPr id="14" name="Flowchart: Connector 13"/>
+          <p:cNvSpPr/>
+          <p:nvPr/>
+        </p:nvSpPr>
+        <p:spPr>
+          <a:xfrm>
+            <a:off x="7258595" y="3886822"/>
+            <a:ext cx="457200" cy="457200"/>
+          </a:xfrm>
+          <a:prstGeom prst="flowChartConnector">
+            <a:avLst/>
+          </a:prstGeom>
+        </p:spPr>
+        <p:style>
+          <a:lnRef idx="2">
+            <a:schemeClr val="accent1">
+              <a:shade val="50000"/>
+            </a:schemeClr>
+          </a:lnRef>
+          <a:fillRef idx="1">
+            <a:schemeClr val="accent1"/>
+          </a:fillRef>
+          <a:effectRef idx="0">
+            <a:schemeClr val="accent1"/>
+          </a:effectRef>
+          <a:fontRef idx="minor">
+            <a:schemeClr val="lt1"/>
+          </a:fontRef>
+        </p:style>
+        <p:txBody>
+          <a:bodyPr rtlCol="0" anchor="ctr"/>
+          <a:lstStyle/>
+          <a:p>
+            <a:pPr algn="ctr"/>
+            <a:endParaRPr lang="en-US"/>
+          </a:p>
+        </p:txBody>
+      </p:sp>
+      <p:sp>
+        <p:nvSpPr>
+          <p:cNvPr id="15" name="Flowchart: Connector 14"/>
+          <p:cNvSpPr/>
+          <p:nvPr/>
+        </p:nvSpPr>
+        <p:spPr>
+          <a:xfrm>
+            <a:off x="7676607" y="4499844"/>
+            <a:ext cx="457200" cy="457200"/>
+          </a:xfrm>
+          <a:prstGeom prst="flowChartConnector">
+            <a:avLst/>
+          </a:prstGeom>
+        </p:spPr>
+        <p:style>
+          <a:lnRef idx="2">
+            <a:schemeClr val="accent1">
+              <a:shade val="50000"/>
+            </a:schemeClr>
+          </a:lnRef>
+          <a:fillRef idx="1">
+            <a:schemeClr val="accent1"/>
+          </a:fillRef>
+          <a:effectRef idx="0">
+            <a:schemeClr val="accent1"/>
+          </a:effectRef>
+          <a:fontRef idx="minor">
+            <a:schemeClr val="lt1"/>
+          </a:fontRef>
+        </p:style>
+        <p:txBody>
+          <a:bodyPr rtlCol="0" anchor="ctr"/>
+          <a:lstStyle/>
+          <a:p>
+            <a:pPr algn="ctr"/>
+            <a:endParaRPr lang="en-US"/>
+          </a:p>
+        </p:txBody>
+      </p:sp>
+      <p:sp>
+        <p:nvSpPr>
+          <p:cNvPr id="16" name="Flowchart: Connector 15"/>
+          <p:cNvSpPr/>
+          <p:nvPr/>
+        </p:nvSpPr>
+        <p:spPr>
+          <a:xfrm>
+            <a:off x="7215054" y="4357706"/>
+            <a:ext cx="457200" cy="457200"/>
+          </a:xfrm>
+          <a:prstGeom prst="flowChartConnector">
+            <a:avLst/>
+          </a:prstGeom>
+        </p:spPr>
+        <p:style>
+          <a:lnRef idx="2">
+            <a:schemeClr val="accent1">
+              <a:shade val="50000"/>
+            </a:schemeClr>
+          </a:lnRef>
+          <a:fillRef idx="1">
+            <a:schemeClr val="accent1"/>
+          </a:fillRef>
+          <a:effectRef idx="0">
+            <a:schemeClr val="accent1"/>
+          </a:effectRef>
+          <a:fontRef idx="minor">
+            <a:schemeClr val="lt1"/>
+          </a:fontRef>
+        </p:style>
+        <p:txBody>
+          <a:bodyPr rtlCol="0" anchor="ctr"/>
+          <a:lstStyle/>
+          <a:p>
+            <a:pPr algn="ctr"/>
+            <a:endParaRPr lang="en-US"/>
+          </a:p>
+        </p:txBody>
+      </p:sp>
+      <p:sp>
+        <p:nvSpPr>
+          <p:cNvPr id="17" name="Flowchart: Connector 16"/>
+          <p:cNvSpPr/>
+          <p:nvPr/>
+        </p:nvSpPr>
+        <p:spPr>
+          <a:xfrm>
+            <a:off x="6816636" y="4083997"/>
+            <a:ext cx="457200" cy="457200"/>
+          </a:xfrm>
+          <a:prstGeom prst="flowChartConnector">
+            <a:avLst/>
+          </a:prstGeom>
+        </p:spPr>
+        <p:style>
+          <a:lnRef idx="2">
+            <a:schemeClr val="accent1">
+              <a:shade val="50000"/>
+            </a:schemeClr>
+          </a:lnRef>
+          <a:fillRef idx="1">
+            <a:schemeClr val="accent1"/>
+          </a:fillRef>
+          <a:effectRef idx="0">
+            <a:schemeClr val="accent1"/>
+          </a:effectRef>
+          <a:fontRef idx="minor">
+            <a:schemeClr val="lt1"/>
+          </a:fontRef>
+        </p:style>
+        <p:txBody>
+          <a:bodyPr rtlCol="0" anchor="ctr"/>
+          <a:lstStyle/>
+          <a:p>
+            <a:pPr algn="ctr"/>
+            <a:endParaRPr lang="en-US"/>
+          </a:p>
+        </p:txBody>
+      </p:sp>
+      <p:sp>
+        <p:nvSpPr>
+          <p:cNvPr id="18" name="Flowchart: Connector 17"/>
+          <p:cNvSpPr/>
+          <p:nvPr/>
+        </p:nvSpPr>
+        <p:spPr>
+          <a:xfrm>
+            <a:off x="6762207" y="3626797"/>
+            <a:ext cx="457200" cy="457200"/>
+          </a:xfrm>
+          <a:prstGeom prst="flowChartConnector">
+            <a:avLst/>
+          </a:prstGeom>
+        </p:spPr>
+        <p:style>
+          <a:lnRef idx="2">
+            <a:schemeClr val="accent1">
+              <a:shade val="50000"/>
+            </a:schemeClr>
+          </a:lnRef>
+          <a:fillRef idx="1">
+            <a:schemeClr val="accent1"/>
+          </a:fillRef>
+          <a:effectRef idx="0">
+            <a:schemeClr val="accent1"/>
+          </a:effectRef>
+          <a:fontRef idx="minor">
+            <a:schemeClr val="lt1"/>
+          </a:fontRef>
+        </p:style>
+        <p:txBody>
+          <a:bodyPr rtlCol="0" anchor="ctr"/>
+          <a:lstStyle/>
+          <a:p>
+            <a:pPr algn="ctr"/>
+            <a:endParaRPr lang="en-US"/>
+          </a:p>
+        </p:txBody>
+      </p:sp>
+      <p:sp>
+        <p:nvSpPr>
+          <p:cNvPr id="19" name="TextBox 18"/>
+          <p:cNvSpPr txBox="1"/>
+          <p:nvPr/>
+        </p:nvSpPr>
+        <p:spPr>
+          <a:xfrm>
+            <a:off x="3761111" y="2634005"/>
+            <a:ext cx="2461508" cy="523220"/>
+          </a:xfrm>
+          <a:prstGeom prst="rect">
+            <a:avLst/>
+          </a:prstGeom>
+          <a:noFill/>
+        </p:spPr>
+        <p:txBody>
+          <a:bodyPr wrap="none" rtlCol="0">
+            <a:spAutoFit/>
+          </a:bodyPr>
+          <a:lstStyle/>
+          <a:p>
+            <a:r>
+              <a:rPr lang="en-US" sz="2800" dirty="0"/>
+              <a:t>Molecule/Atom</a:t>
+            </a:r>
+          </a:p>
+        </p:txBody>
+      </p:sp>
+      <p:sp>
+        <p:nvSpPr>
+          <p:cNvPr id="20" name="TextBox 19"/>
+          <p:cNvSpPr txBox="1"/>
+          <p:nvPr/>
+        </p:nvSpPr>
+        <p:spPr>
+          <a:xfrm>
+            <a:off x="8351523" y="2600300"/>
+            <a:ext cx="1202702" cy="523220"/>
+          </a:xfrm>
+          <a:prstGeom prst="rect">
+            <a:avLst/>
+          </a:prstGeom>
+          <a:noFill/>
+        </p:spPr>
+        <p:txBody>
+          <a:bodyPr wrap="none" rtlCol="0">
+            <a:spAutoFit/>
+          </a:bodyPr>
+          <a:lstStyle/>
+          <a:p>
+            <a:r>
+              <a:rPr lang="en-US" sz="2800" dirty="0"/>
+              <a:t>Cluster</a:t>
+            </a:r>
+          </a:p>
+        </p:txBody>
+      </p:sp>
+      <p:cxnSp>
+        <p:nvCxnSpPr>
+          <p:cNvPr id="22" name="Straight Arrow Connector 21"/>
+          <p:cNvCxnSpPr/>
+          <p:nvPr/>
+        </p:nvCxnSpPr>
+        <p:spPr>
+          <a:xfrm flipV="1">
+            <a:off x="3705995" y="3550917"/>
+            <a:ext cx="228600" cy="6221"/>
+          </a:xfrm>
+          <a:prstGeom prst="straightConnector1">
+            <a:avLst/>
+          </a:prstGeom>
+          <a:ln>
+            <a:tailEnd type="triangle"/>
+          </a:ln>
+        </p:spPr>
+        <p:style>
+          <a:lnRef idx="1">
+            <a:schemeClr val="dk1"/>
+          </a:lnRef>
+          <a:fillRef idx="0">
+            <a:schemeClr val="dk1"/>
+          </a:fillRef>
+          <a:effectRef idx="0">
+            <a:schemeClr val="dk1"/>
+          </a:effectRef>
+          <a:fontRef idx="minor">
+            <a:schemeClr val="tx1"/>
+          </a:fontRef>
+        </p:style>
+      </p:cxnSp>
+      <p:cxnSp>
+        <p:nvCxnSpPr>
+          <p:cNvPr id="24" name="Straight Arrow Connector 23"/>
+          <p:cNvCxnSpPr/>
+          <p:nvPr/>
+        </p:nvCxnSpPr>
+        <p:spPr>
+          <a:xfrm flipV="1">
+            <a:off x="7847973" y="4009505"/>
+            <a:ext cx="1121856" cy="12460"/>
+          </a:xfrm>
+          <a:prstGeom prst="straightConnector1">
+            <a:avLst/>
+          </a:prstGeom>
+          <a:ln>
+            <a:tailEnd type="triangle"/>
+          </a:ln>
+        </p:spPr>
+        <p:style>
+          <a:lnRef idx="1">
+            <a:schemeClr val="dk1"/>
+          </a:lnRef>
+          <a:fillRef idx="0">
+            <a:schemeClr val="dk1"/>
+          </a:fillRef>
+          <a:effectRef idx="0">
+            <a:schemeClr val="dk1"/>
+          </a:effectRef>
+          <a:fontRef idx="minor">
+            <a:schemeClr val="tx1"/>
+          </a:fontRef>
+        </p:style>
+      </p:cxnSp>
+      <p:sp>
+        <p:nvSpPr>
+          <p:cNvPr id="26" name="TextBox 25"/>
+          <p:cNvSpPr txBox="1"/>
+          <p:nvPr/>
+        </p:nvSpPr>
+        <p:spPr>
+          <a:xfrm>
+            <a:off x="3669779" y="3270127"/>
+            <a:ext cx="264816" cy="369332"/>
+          </a:xfrm>
+          <a:prstGeom prst="rect">
+            <a:avLst/>
+          </a:prstGeom>
+          <a:noFill/>
+        </p:spPr>
+        <p:txBody>
+          <a:bodyPr wrap="none" rtlCol="0">
+            <a:spAutoFit/>
+          </a:bodyPr>
+          <a:lstStyle/>
+          <a:p>
+            <a:r>
+              <a:rPr lang="en-US" dirty="0"/>
+              <a:t>r</a:t>
+            </a:r>
+          </a:p>
+        </p:txBody>
+      </p:sp>
+      <p:sp>
+        <p:nvSpPr>
+          <p:cNvPr id="27" name="TextBox 26"/>
+          <p:cNvSpPr txBox="1"/>
+          <p:nvPr/>
+        </p:nvSpPr>
+        <p:spPr>
+          <a:xfrm>
+            <a:off x="8157754" y="3661270"/>
+            <a:ext cx="309700" cy="369332"/>
+          </a:xfrm>
+          <a:prstGeom prst="rect">
+            <a:avLst/>
+          </a:prstGeom>
+          <a:noFill/>
+        </p:spPr>
+        <p:txBody>
+          <a:bodyPr wrap="none" rtlCol="0">
+            <a:spAutoFit/>
+          </a:bodyPr>
+          <a:lstStyle/>
+          <a:p>
+            <a:r>
+              <a:rPr lang="en-US" dirty="0"/>
+              <a:t>R</a:t>
+            </a:r>
+          </a:p>
+        </p:txBody>
+      </p:sp>
+      <p:sp>
+        <p:nvSpPr>
+          <p:cNvPr id="29" name="TextBox 28"/>
+          <p:cNvSpPr txBox="1"/>
+          <p:nvPr/>
+        </p:nvSpPr>
+        <p:spPr>
+          <a:xfrm>
+            <a:off x="2333439" y="5632565"/>
+            <a:ext cx="1563761" cy="523220"/>
+          </a:xfrm>
+          <a:prstGeom prst="rect">
+            <a:avLst/>
+          </a:prstGeom>
+          <a:noFill/>
+        </p:spPr>
+        <p:txBody>
+          <a:bodyPr wrap="none" rtlCol="0">
+            <a:spAutoFit/>
+          </a:bodyPr>
+          <a:lstStyle/>
+          <a:p>
+            <a:r>
+              <a:rPr lang="en-US" sz="2800" dirty="0"/>
+              <a:t>Substrate</a:t>
+            </a:r>
+          </a:p>
+        </p:txBody>
+      </p:sp>
+      <p:cxnSp>
+        <p:nvCxnSpPr>
+          <p:cNvPr id="31" name="Straight Arrow Connector 30"/>
+          <p:cNvCxnSpPr/>
+          <p:nvPr/>
+        </p:nvCxnSpPr>
+        <p:spPr>
+          <a:xfrm>
+            <a:off x="4035740" y="3523222"/>
+            <a:ext cx="358729" cy="10889"/>
+          </a:xfrm>
+          <a:prstGeom prst="straightConnector1">
+            <a:avLst/>
+          </a:prstGeom>
+          <a:ln>
+            <a:solidFill>
+              <a:srgbClr val="FF0000"/>
+            </a:solidFill>
+            <a:tailEnd type="triangle"/>
+          </a:ln>
+        </p:spPr>
+        <p:style>
+          <a:lnRef idx="2">
+            <a:schemeClr val="accent6"/>
+          </a:lnRef>
+          <a:fillRef idx="0">
+            <a:schemeClr val="accent6"/>
+          </a:fillRef>
+          <a:effectRef idx="1">
+            <a:schemeClr val="accent6"/>
+          </a:effectRef>
+          <a:fontRef idx="minor">
+            <a:schemeClr val="tx1"/>
+          </a:fontRef>
+        </p:style>
+      </p:cxnSp>
+      <p:cxnSp>
+        <p:nvCxnSpPr>
+          <p:cNvPr id="33" name="Straight Arrow Connector 32"/>
+          <p:cNvCxnSpPr/>
+          <p:nvPr/>
+        </p:nvCxnSpPr>
+        <p:spPr>
+          <a:xfrm>
+            <a:off x="3720333" y="3862641"/>
+            <a:ext cx="2672" cy="306188"/>
+          </a:xfrm>
+          <a:prstGeom prst="straightConnector1">
+            <a:avLst/>
+          </a:prstGeom>
+          <a:ln>
+            <a:solidFill>
+              <a:srgbClr val="FF0000"/>
+            </a:solidFill>
+            <a:tailEnd type="triangle"/>
+          </a:ln>
+        </p:spPr>
+        <p:style>
+          <a:lnRef idx="2">
+            <a:schemeClr val="accent6"/>
+          </a:lnRef>
+          <a:fillRef idx="0">
+            <a:schemeClr val="accent6"/>
+          </a:fillRef>
+          <a:effectRef idx="1">
+            <a:schemeClr val="accent6"/>
+          </a:effectRef>
+          <a:fontRef idx="minor">
+            <a:schemeClr val="tx1"/>
+          </a:fontRef>
+        </p:style>
+      </p:cxnSp>
+      <p:cxnSp>
+        <p:nvCxnSpPr>
+          <p:cNvPr id="35" name="Straight Arrow Connector 34"/>
+          <p:cNvCxnSpPr/>
+          <p:nvPr/>
+        </p:nvCxnSpPr>
+        <p:spPr>
+          <a:xfrm flipH="1" flipV="1">
+            <a:off x="2913861" y="3556113"/>
+            <a:ext cx="401043" cy="3193"/>
+          </a:xfrm>
+          <a:prstGeom prst="straightConnector1">
+            <a:avLst/>
+          </a:prstGeom>
+          <a:ln>
+            <a:solidFill>
+              <a:srgbClr val="FF0000"/>
+            </a:solidFill>
+            <a:tailEnd type="triangle"/>
+          </a:ln>
+        </p:spPr>
+        <p:style>
+          <a:lnRef idx="2">
+            <a:schemeClr val="accent6"/>
+          </a:lnRef>
+          <a:fillRef idx="0">
+            <a:schemeClr val="accent6"/>
+          </a:fillRef>
+          <a:effectRef idx="1">
+            <a:schemeClr val="accent6"/>
+          </a:effectRef>
+          <a:fontRef idx="minor">
+            <a:schemeClr val="tx1"/>
+          </a:fontRef>
+        </p:style>
+      </p:cxnSp>
+      <p:cxnSp>
+        <p:nvCxnSpPr>
+          <p:cNvPr id="36" name="Straight Arrow Connector 35"/>
+          <p:cNvCxnSpPr/>
+          <p:nvPr/>
+        </p:nvCxnSpPr>
+        <p:spPr>
+          <a:xfrm flipV="1">
+            <a:off x="3715481" y="2899984"/>
+            <a:ext cx="10111" cy="283864"/>
+          </a:xfrm>
+          <a:prstGeom prst="straightConnector1">
+            <a:avLst/>
+          </a:prstGeom>
+          <a:ln>
+            <a:solidFill>
+              <a:srgbClr val="FF0000"/>
+            </a:solidFill>
+            <a:tailEnd type="triangle"/>
+          </a:ln>
+        </p:spPr>
+        <p:style>
+          <a:lnRef idx="2">
+            <a:schemeClr val="accent6"/>
+          </a:lnRef>
+          <a:fillRef idx="0">
+            <a:schemeClr val="accent6"/>
+          </a:fillRef>
+          <a:effectRef idx="1">
+            <a:schemeClr val="accent6"/>
+          </a:effectRef>
+          <a:fontRef idx="minor">
+            <a:schemeClr val="tx1"/>
+          </a:fontRef>
+        </p:style>
+      </p:cxnSp>
+      <p:cxnSp>
+        <p:nvCxnSpPr>
+          <p:cNvPr id="42" name="Straight Arrow Connector 41"/>
+          <p:cNvCxnSpPr/>
+          <p:nvPr/>
+        </p:nvCxnSpPr>
+        <p:spPr>
+          <a:xfrm>
+            <a:off x="9161667" y="4040434"/>
+            <a:ext cx="358729" cy="10889"/>
+          </a:xfrm>
+          <a:prstGeom prst="straightConnector1">
+            <a:avLst/>
+          </a:prstGeom>
+          <a:ln>
+            <a:solidFill>
+              <a:srgbClr val="FF0000"/>
+            </a:solidFill>
+            <a:tailEnd type="triangle"/>
+          </a:ln>
+        </p:spPr>
+        <p:style>
+          <a:lnRef idx="2">
+            <a:schemeClr val="accent6"/>
+          </a:lnRef>
+          <a:fillRef idx="0">
+            <a:schemeClr val="accent6"/>
+          </a:fillRef>
+          <a:effectRef idx="1">
+            <a:schemeClr val="accent6"/>
+          </a:effectRef>
+          <a:fontRef idx="minor">
+            <a:schemeClr val="tx1"/>
+          </a:fontRef>
+        </p:style>
+      </p:cxnSp>
+      <p:cxnSp>
+        <p:nvCxnSpPr>
+          <p:cNvPr id="43" name="Straight Arrow Connector 42"/>
+          <p:cNvCxnSpPr/>
+          <p:nvPr/>
+        </p:nvCxnSpPr>
+        <p:spPr>
+          <a:xfrm>
+            <a:off x="7902535" y="5149011"/>
+            <a:ext cx="2672" cy="306188"/>
+          </a:xfrm>
+          <a:prstGeom prst="straightConnector1">
+            <a:avLst/>
+          </a:prstGeom>
+          <a:ln>
+            <a:solidFill>
+              <a:srgbClr val="FF0000"/>
+            </a:solidFill>
+            <a:tailEnd type="triangle"/>
+          </a:ln>
+        </p:spPr>
+        <p:style>
+          <a:lnRef idx="2">
+            <a:schemeClr val="accent6"/>
+          </a:lnRef>
+          <a:fillRef idx="0">
+            <a:schemeClr val="accent6"/>
+          </a:fillRef>
+          <a:effectRef idx="1">
+            <a:schemeClr val="accent6"/>
+          </a:effectRef>
+          <a:fontRef idx="minor">
+            <a:schemeClr val="tx1"/>
+          </a:fontRef>
+        </p:style>
+      </p:cxnSp>
+      <p:cxnSp>
+        <p:nvCxnSpPr>
+          <p:cNvPr id="44" name="Straight Arrow Connector 43"/>
+          <p:cNvCxnSpPr/>
+          <p:nvPr/>
+        </p:nvCxnSpPr>
+        <p:spPr>
+          <a:xfrm flipH="1" flipV="1">
+            <a:off x="6112377" y="4037641"/>
+            <a:ext cx="401043" cy="3193"/>
+          </a:xfrm>
+          <a:prstGeom prst="straightConnector1">
+            <a:avLst/>
+          </a:prstGeom>
+          <a:ln>
+            <a:solidFill>
+              <a:srgbClr val="FF0000"/>
+            </a:solidFill>
+            <a:tailEnd type="triangle"/>
+          </a:ln>
+        </p:spPr>
+        <p:style>
+          <a:lnRef idx="2">
+            <a:schemeClr val="accent6"/>
+          </a:lnRef>
+          <a:fillRef idx="0">
+            <a:schemeClr val="accent6"/>
+          </a:fillRef>
+          <a:effectRef idx="1">
+            <a:schemeClr val="accent6"/>
+          </a:effectRef>
+          <a:fontRef idx="minor">
+            <a:schemeClr val="tx1"/>
+          </a:fontRef>
+        </p:style>
+      </p:cxnSp>
+      <p:cxnSp>
+        <p:nvCxnSpPr>
+          <p:cNvPr id="45" name="Straight Arrow Connector 44"/>
+          <p:cNvCxnSpPr/>
+          <p:nvPr/>
+        </p:nvCxnSpPr>
+        <p:spPr>
+          <a:xfrm flipV="1">
+            <a:off x="7779708" y="2611751"/>
+            <a:ext cx="10111" cy="283864"/>
+          </a:xfrm>
+          <a:prstGeom prst="straightConnector1">
+            <a:avLst/>
+          </a:prstGeom>
+          <a:ln>
+            <a:solidFill>
+              <a:srgbClr val="FF0000"/>
+            </a:solidFill>
+            <a:tailEnd type="triangle"/>
+          </a:ln>
+        </p:spPr>
+        <p:style>
+          <a:lnRef idx="2">
+            <a:schemeClr val="accent6"/>
+          </a:lnRef>
+          <a:fillRef idx="0">
+            <a:schemeClr val="accent6"/>
+          </a:fillRef>
+          <a:effectRef idx="1">
+            <a:schemeClr val="accent6"/>
+          </a:effectRef>
+          <a:fontRef idx="minor">
+            <a:schemeClr val="tx1"/>
+          </a:fontRef>
+        </p:style>
+      </p:cxnSp>
+      <p:sp>
+        <p:nvSpPr>
+          <p:cNvPr id="3" name="TextBox 2"/>
+          <p:cNvSpPr txBox="1"/>
+          <p:nvPr/>
+        </p:nvSpPr>
+        <p:spPr>
+          <a:xfrm>
+            <a:off x="3665412" y="3533079"/>
+            <a:ext cx="650306" cy="276999"/>
+          </a:xfrm>
+          <a:prstGeom prst="rect">
+            <a:avLst/>
+          </a:prstGeom>
+          <a:noFill/>
+        </p:spPr>
+        <p:txBody>
+          <a:bodyPr wrap="none" rtlCol="0">
+            <a:spAutoFit/>
+          </a:bodyPr>
+          <a:lstStyle/>
+          <a:p>
+            <a:r>
+              <a:rPr lang="en-US" sz="1200" dirty="0"/>
+              <a:t>2 pixels</a:t>
+            </a:r>
+          </a:p>
+        </p:txBody>
+      </p:sp>
+    </p:spTree>
+    <p:extLst>
+      <p:ext uri="{BB962C8B-B14F-4D97-AF65-F5344CB8AC3E}">
+        <p14:creationId xmlns:p14="http://schemas.microsoft.com/office/powerpoint/2010/main" val="220388363"/>
+      </p:ext>
+    </p:extLst>
+  </p:cSld>
+  <p:clrMapOvr>
+    <a:masterClrMapping/>
+  </p:clrMapOvr>
+</p:sld>
+</file>
+
+<file path=ppt/slides/slide11.xml><?xml version="1.0" encoding="utf-8"?>
 <p:sld xmlns:a="http://schemas.openxmlformats.org/drawingml/2006/main" xmlns:r="http://schemas.openxmlformats.org/officeDocument/2006/relationships" xmlns:p="http://schemas.openxmlformats.org/presentationml/2006/main">
   <p:cSld>
     <p:spTree>
@@ -3586,18 +4847,18 @@
           <p:cNvPr id="29" name="Elbow Connector 28"/>
           <p:cNvCxnSpPr>
             <a:stCxn id="9" idx="2"/>
-            <a:endCxn id="4" idx="4"/>
+            <a:endCxn id="5" idx="2"/>
           </p:cNvCxnSpPr>
           <p:nvPr/>
         </p:nvCxnSpPr>
         <p:spPr>
           <a:xfrm rot="5400000" flipH="1">
-            <a:off x="4870741" y="-160969"/>
-            <a:ext cx="432579" cy="8214633"/>
+            <a:off x="5670841" y="639131"/>
+            <a:ext cx="203979" cy="6843032"/>
           </a:xfrm>
           <a:prstGeom prst="bentConnector3">
             <a:avLst>
-              <a:gd name="adj1" fmla="val -52846"/>
+              <a:gd name="adj1" fmla="val -112070"/>
             </a:avLst>
           </a:prstGeom>
           <a:ln>
@@ -3619,6 +4880,64 @@
           </a:fontRef>
         </p:style>
       </p:cxnSp>
+      <p:sp>
+        <p:nvSpPr>
+          <p:cNvPr id="18" name="TextBox 17"/>
+          <p:cNvSpPr txBox="1"/>
+          <p:nvPr/>
+        </p:nvSpPr>
+        <p:spPr>
+          <a:xfrm>
+            <a:off x="9195972" y="4060647"/>
+            <a:ext cx="455574" cy="369332"/>
+          </a:xfrm>
+          <a:prstGeom prst="rect">
+            <a:avLst/>
+          </a:prstGeom>
+          <a:noFill/>
+        </p:spPr>
+        <p:txBody>
+          <a:bodyPr wrap="none" rtlCol="0">
+            <a:spAutoFit/>
+          </a:bodyPr>
+          <a:lstStyle/>
+          <a:p>
+            <a:r>
+              <a:rPr lang="en-US" dirty="0"/>
+              <a:t>No</a:t>
+            </a:r>
+          </a:p>
+        </p:txBody>
+      </p:sp>
+      <p:sp>
+        <p:nvSpPr>
+          <p:cNvPr id="23" name="TextBox 22"/>
+          <p:cNvSpPr txBox="1"/>
+          <p:nvPr/>
+        </p:nvSpPr>
+        <p:spPr>
+          <a:xfrm>
+            <a:off x="10038526" y="3158231"/>
+            <a:ext cx="485518" cy="369332"/>
+          </a:xfrm>
+          <a:prstGeom prst="rect">
+            <a:avLst/>
+          </a:prstGeom>
+          <a:noFill/>
+        </p:spPr>
+        <p:txBody>
+          <a:bodyPr wrap="none" rtlCol="0">
+            <a:spAutoFit/>
+          </a:bodyPr>
+          <a:lstStyle/>
+          <a:p>
+            <a:r>
+              <a:rPr lang="en-US" dirty="0"/>
+              <a:t>Yes</a:t>
+            </a:r>
+          </a:p>
+        </p:txBody>
+      </p:sp>
     </p:spTree>
     <p:extLst>
       <p:ext uri="{BB962C8B-B14F-4D97-AF65-F5344CB8AC3E}">
@@ -3632,7 +4951,7 @@
 </p:sld>
 </file>
 
-<file path=ppt/slides/slide11.xml><?xml version="1.0" encoding="utf-8"?>
+<file path=ppt/slides/slide12.xml><?xml version="1.0" encoding="utf-8"?>
 <p:sld xmlns:a="http://schemas.openxmlformats.org/drawingml/2006/main" xmlns:r="http://schemas.openxmlformats.org/officeDocument/2006/relationships" xmlns:p="http://schemas.openxmlformats.org/presentationml/2006/main">
   <p:cSld>
     <p:spTree>
@@ -3671,8 +4990,8 @@
           </a:p>
         </p:txBody>
       </p:sp>
-      <mc:AlternateContent xmlns:mc="http://schemas.openxmlformats.org/markup-compatibility/2006" xmlns:a14="http://schemas.microsoft.com/office/drawing/2010/main">
-        <mc:Choice Requires="a14">
+      <mc:AlternateContent xmlns:mc="http://schemas.openxmlformats.org/markup-compatibility/2006">
+        <mc:Choice xmlns:a14="http://schemas.microsoft.com/office/drawing/2010/main" Requires="a14">
           <p:sp>
             <p:nvSpPr>
               <p:cNvPr id="3" name="Content Placeholder 2"/>
@@ -3685,7 +5004,9 @@
             </p:nvSpPr>
             <p:spPr/>
             <p:txBody>
-              <a:bodyPr/>
+              <a:bodyPr>
+                <a:normAutofit fontScale="92500" lnSpcReduction="10000"/>
+              </a:bodyPr>
               <a:lstStyle/>
               <a:p>
                 <a14:m>
@@ -3912,10 +5233,19 @@
                 </a:r>
                 <a:endParaRPr lang="en-US" dirty="0"/>
               </a:p>
+              <a:p>
+                <a:endParaRPr lang="en-US" dirty="0"/>
+              </a:p>
+              <a:p>
+                <a:r>
+                  <a:rPr lang="en-US" dirty="0"/>
+                  <a:t>Minimum Critical Size is 1, and the maximum critical size is 10</a:t>
+                </a:r>
+              </a:p>
             </p:txBody>
           </p:sp>
         </mc:Choice>
-        <mc:Fallback xmlns="">
+        <mc:Fallback>
           <p:sp>
             <p:nvSpPr>
               <p:cNvPr id="3" name="Content Placeholder 2"/>
@@ -3930,7 +5260,7 @@
               <a:blipFill>
                 <a:blip r:embed="rId2"/>
                 <a:stretch>
-                  <a:fillRect l="-1043"/>
+                  <a:fillRect l="-928" b="-3641"/>
                 </a:stretch>
               </a:blipFill>
             </p:spPr>
@@ -3962,7 +5292,7 @@
 </p:sld>
 </file>
 
-<file path=ppt/slides/slide12.xml><?xml version="1.0" encoding="utf-8"?>
+<file path=ppt/slides/slide13.xml><?xml version="1.0" encoding="utf-8"?>
 <p:sld xmlns:a="http://schemas.openxmlformats.org/drawingml/2006/main" xmlns:r="http://schemas.openxmlformats.org/officeDocument/2006/relationships" xmlns:p="http://schemas.openxmlformats.org/presentationml/2006/main">
   <p:cSld>
     <p:spTree>
@@ -4607,7 +5937,7 @@
 </p:sld>
 </file>
 
-<file path=ppt/slides/slide13.xml><?xml version="1.0" encoding="utf-8"?>
+<file path=ppt/slides/slide14.xml><?xml version="1.0" encoding="utf-8"?>
 <p:sld xmlns:a="http://schemas.openxmlformats.org/drawingml/2006/main" xmlns:r="http://schemas.openxmlformats.org/officeDocument/2006/relationships" xmlns:p="http://schemas.openxmlformats.org/presentationml/2006/main">
   <p:cSld>
     <p:spTree>
@@ -5600,7 +6930,7 @@
 </p:sld>
 </file>
 
-<file path=ppt/slides/slide14.xml><?xml version="1.0" encoding="utf-8"?>
+<file path=ppt/slides/slide15.xml><?xml version="1.0" encoding="utf-8"?>
 <p:sld xmlns:a="http://schemas.openxmlformats.org/drawingml/2006/main" xmlns:r="http://schemas.openxmlformats.org/officeDocument/2006/relationships" xmlns:p="http://schemas.openxmlformats.org/presentationml/2006/main">
   <p:cSld>
     <p:spTree>
@@ -7367,120 +8697,6 @@
 </p:sld>
 </file>
 
-<file path=ppt/slides/slide15.xml><?xml version="1.0" encoding="utf-8"?>
-<p:sld xmlns:a="http://schemas.openxmlformats.org/drawingml/2006/main" xmlns:r="http://schemas.openxmlformats.org/officeDocument/2006/relationships" xmlns:p="http://schemas.openxmlformats.org/presentationml/2006/main">
-  <p:cSld>
-    <p:spTree>
-      <p:nvGrpSpPr>
-        <p:cNvPr id="1" name=""/>
-        <p:cNvGrpSpPr/>
-        <p:nvPr/>
-      </p:nvGrpSpPr>
-      <p:grpSpPr>
-        <a:xfrm>
-          <a:off x="0" y="0"/>
-          <a:ext cx="0" cy="0"/>
-          <a:chOff x="0" y="0"/>
-          <a:chExt cx="0" cy="0"/>
-        </a:xfrm>
-      </p:grpSpPr>
-      <p:sp>
-        <p:nvSpPr>
-          <p:cNvPr id="2" name="Title 1"/>
-          <p:cNvSpPr>
-            <a:spLocks noGrp="1"/>
-          </p:cNvSpPr>
-          <p:nvPr>
-            <p:ph type="title"/>
-          </p:nvPr>
-        </p:nvSpPr>
-        <p:spPr/>
-        <p:txBody>
-          <a:bodyPr/>
-          <a:lstStyle/>
-          <a:p>
-            <a:r>
-              <a:rPr lang="en-US" dirty="0"/>
-              <a:t>Surface Diffusion</a:t>
-            </a:r>
-          </a:p>
-        </p:txBody>
-      </p:sp>
-      <p:sp>
-        <p:nvSpPr>
-          <p:cNvPr id="3" name="Content Placeholder 2"/>
-          <p:cNvSpPr>
-            <a:spLocks noGrp="1"/>
-          </p:cNvSpPr>
-          <p:nvPr>
-            <p:ph idx="1"/>
-          </p:nvPr>
-        </p:nvSpPr>
-        <p:spPr/>
-        <p:txBody>
-          <a:bodyPr/>
-          <a:lstStyle/>
-          <a:p>
-            <a:r>
-              <a:rPr lang="en-US" dirty="0"/>
-              <a:t>We assume no holes or steps, etc.</a:t>
-            </a:r>
-          </a:p>
-          <a:p>
-            <a:r>
-              <a:rPr lang="en-US" dirty="0"/>
-              <a:t>Diffusion across the surface is equally likely in all directions</a:t>
-            </a:r>
-          </a:p>
-          <a:p>
-            <a:r>
-              <a:rPr lang="en-US" dirty="0"/>
-              <a:t>To simulate this, each molecule or cluster can move across the surface 0 to 4 pixels (at random), based on temperature.</a:t>
-            </a:r>
-          </a:p>
-          <a:p>
-            <a:pPr lvl="1"/>
-            <a:r>
-              <a:rPr lang="en-US" dirty="0"/>
-              <a:t>0 K – 400 K : 1 pixel max</a:t>
-            </a:r>
-          </a:p>
-          <a:p>
-            <a:pPr lvl="1"/>
-            <a:r>
-              <a:rPr lang="en-US" dirty="0"/>
-              <a:t>401 K – 800 K : 2 pixels max</a:t>
-            </a:r>
-          </a:p>
-          <a:p>
-            <a:pPr lvl="1"/>
-            <a:r>
-              <a:rPr lang="en-US" dirty="0"/>
-              <a:t>801 K – 1200 K : 3 pixels max</a:t>
-            </a:r>
-          </a:p>
-          <a:p>
-            <a:pPr lvl="1"/>
-            <a:r>
-              <a:rPr lang="en-US" dirty="0"/>
-              <a:t>1201 K – 1687.15  K : 4 pixels m</a:t>
-            </a:r>
-          </a:p>
-        </p:txBody>
-      </p:sp>
-    </p:spTree>
-    <p:extLst>
-      <p:ext uri="{BB962C8B-B14F-4D97-AF65-F5344CB8AC3E}">
-        <p14:creationId xmlns:p14="http://schemas.microsoft.com/office/powerpoint/2010/main" val="108108362"/>
-      </p:ext>
-    </p:extLst>
-  </p:cSld>
-  <p:clrMapOvr>
-    <a:masterClrMapping/>
-  </p:clrMapOvr>
-</p:sld>
-</file>
-
 <file path=ppt/slides/slide16.xml><?xml version="1.0" encoding="utf-8"?>
 <p:sld xmlns:a="http://schemas.openxmlformats.org/drawingml/2006/main" xmlns:r="http://schemas.openxmlformats.org/officeDocument/2006/relationships" xmlns:p="http://schemas.openxmlformats.org/presentationml/2006/main">
   <p:cSld>
@@ -7515,7 +8731,7 @@
           <a:p>
             <a:r>
               <a:rPr lang="en-US" dirty="0"/>
-              <a:t>Termination Condition</a:t>
+              <a:t>Surface Diffusion</a:t>
             </a:r>
           </a:p>
         </p:txBody>
@@ -7530,19 +8746,54 @@
             <p:ph idx="1"/>
           </p:nvPr>
         </p:nvSpPr>
-        <p:spPr>
-          <a:xfrm>
-            <a:off x="838200" y="3009990"/>
-            <a:ext cx="10515600" cy="1170124"/>
-          </a:xfrm>
-        </p:spPr>
+        <p:spPr/>
         <p:txBody>
           <a:bodyPr/>
           <a:lstStyle/>
           <a:p>
             <a:r>
               <a:rPr lang="en-US" dirty="0"/>
-              <a:t>The simulation terminates when 1 cluster covers 75% of the substrate area </a:t>
+              <a:t>We assume no holes or steps, etc.</a:t>
+            </a:r>
+          </a:p>
+          <a:p>
+            <a:r>
+              <a:rPr lang="en-US" dirty="0"/>
+              <a:t>Diffusion across the surface is equally likely in all directions</a:t>
+            </a:r>
+          </a:p>
+          <a:p>
+            <a:r>
+              <a:rPr lang="en-US" dirty="0"/>
+              <a:t>To simulate this, each molecule or cluster can move across the surface 0 to 4 pixels (at random), based on temperature.</a:t>
+            </a:r>
+          </a:p>
+          <a:p>
+            <a:pPr lvl="1"/>
+            <a:r>
+              <a:rPr lang="en-US" dirty="0"/>
+              <a:t>0 K – 400 K : 1 pixel max</a:t>
+            </a:r>
+          </a:p>
+          <a:p>
+            <a:pPr lvl="1"/>
+            <a:r>
+              <a:rPr lang="en-US" dirty="0"/>
+              <a:t>401 K – 800 K : 2 pixels max</a:t>
+            </a:r>
+          </a:p>
+          <a:p>
+            <a:pPr lvl="1"/>
+            <a:r>
+              <a:rPr lang="en-US" dirty="0"/>
+              <a:t>801 K – 1200 K : 3 pixels max</a:t>
+            </a:r>
+          </a:p>
+          <a:p>
+            <a:pPr lvl="1"/>
+            <a:r>
+              <a:rPr lang="en-US" dirty="0"/>
+              <a:t>1201 K – 1687.15  K : 4 pixels m</a:t>
             </a:r>
           </a:p>
         </p:txBody>
@@ -7550,7 +8801,7 @@
     </p:spTree>
     <p:extLst>
       <p:ext uri="{BB962C8B-B14F-4D97-AF65-F5344CB8AC3E}">
-        <p14:creationId xmlns:p14="http://schemas.microsoft.com/office/powerpoint/2010/main" val="77648711"/>
+        <p14:creationId xmlns:p14="http://schemas.microsoft.com/office/powerpoint/2010/main" val="108108362"/>
       </p:ext>
     </p:extLst>
   </p:cSld>
@@ -7587,10 +8838,32 @@
             <p:ph type="title"/>
           </p:nvPr>
         </p:nvSpPr>
+        <p:spPr/>
+        <p:txBody>
+          <a:bodyPr/>
+          <a:lstStyle/>
+          <a:p>
+            <a:r>
+              <a:rPr lang="en-US" dirty="0"/>
+              <a:t>Termination Condition</a:t>
+            </a:r>
+          </a:p>
+        </p:txBody>
+      </p:sp>
+      <p:sp>
+        <p:nvSpPr>
+          <p:cNvPr id="3" name="Content Placeholder 2"/>
+          <p:cNvSpPr>
+            <a:spLocks noGrp="1"/>
+          </p:cNvSpPr>
+          <p:nvPr>
+            <p:ph idx="1"/>
+          </p:nvPr>
+        </p:nvSpPr>
         <p:spPr>
           <a:xfrm>
-            <a:off x="3903617" y="2672897"/>
-            <a:ext cx="4717869" cy="1325563"/>
+            <a:off x="838200" y="3009990"/>
+            <a:ext cx="10515600" cy="1170124"/>
           </a:xfrm>
         </p:spPr>
         <p:txBody>
@@ -7599,7 +8872,7 @@
           <a:p>
             <a:r>
               <a:rPr lang="en-US" dirty="0"/>
-              <a:t>Demonstration</a:t>
+              <a:t>The simulation terminates when 1 cluster covers 75% of the substrate area </a:t>
             </a:r>
           </a:p>
         </p:txBody>
@@ -7607,7 +8880,7 @@
     </p:spTree>
     <p:extLst>
       <p:ext uri="{BB962C8B-B14F-4D97-AF65-F5344CB8AC3E}">
-        <p14:creationId xmlns:p14="http://schemas.microsoft.com/office/powerpoint/2010/main" val="424713376"/>
+        <p14:creationId xmlns:p14="http://schemas.microsoft.com/office/powerpoint/2010/main" val="77648711"/>
       </p:ext>
     </p:extLst>
   </p:cSld>
@@ -7644,61 +8917,19 @@
             <p:ph type="title"/>
           </p:nvPr>
         </p:nvSpPr>
-        <p:spPr/>
+        <p:spPr>
+          <a:xfrm>
+            <a:off x="3903617" y="2672897"/>
+            <a:ext cx="4717869" cy="1325563"/>
+          </a:xfrm>
+        </p:spPr>
         <p:txBody>
           <a:bodyPr/>
           <a:lstStyle/>
           <a:p>
             <a:r>
               <a:rPr lang="en-US" dirty="0"/>
-              <a:t>Improvements</a:t>
-            </a:r>
-          </a:p>
-        </p:txBody>
-      </p:sp>
-      <p:sp>
-        <p:nvSpPr>
-          <p:cNvPr id="3" name="Content Placeholder 2"/>
-          <p:cNvSpPr>
-            <a:spLocks noGrp="1"/>
-          </p:cNvSpPr>
-          <p:nvPr>
-            <p:ph idx="1"/>
-          </p:nvPr>
-        </p:nvSpPr>
-        <p:spPr/>
-        <p:txBody>
-          <a:bodyPr/>
-          <a:lstStyle/>
-          <a:p>
-            <a:r>
-              <a:rPr lang="en-US" dirty="0"/>
-              <a:t>Materials for the substrate and the film material could be specified.</a:t>
-            </a:r>
-          </a:p>
-          <a:p>
-            <a:pPr lvl="1"/>
-            <a:r>
-              <a:rPr lang="en-US" dirty="0"/>
-              <a:t>Using this, precise calculations could be made for deposition rate, desorption rate, surface diffusion, and critical cluster size</a:t>
-            </a:r>
-          </a:p>
-          <a:p>
-            <a:r>
-              <a:rPr lang="en-US" dirty="0"/>
-              <a:t>Common material configurations can be provided and chosen by the user to provide the values for the above calculations.</a:t>
-            </a:r>
-          </a:p>
-          <a:p>
-            <a:r>
-              <a:rPr lang="en-US" dirty="0"/>
-              <a:t>Different lattice configurations of the substrate can be taken into account.</a:t>
-            </a:r>
-          </a:p>
-          <a:p>
-            <a:r>
-              <a:rPr lang="en-US" dirty="0"/>
-              <a:t>Different colors for the substrate and the film material could be picked</a:t>
+              <a:t>Demonstration</a:t>
             </a:r>
           </a:p>
         </p:txBody>
@@ -7706,7 +8937,7 @@
     </p:spTree>
     <p:extLst>
       <p:ext uri="{BB962C8B-B14F-4D97-AF65-F5344CB8AC3E}">
-        <p14:creationId xmlns:p14="http://schemas.microsoft.com/office/powerpoint/2010/main" val="1689718019"/>
+        <p14:creationId xmlns:p14="http://schemas.microsoft.com/office/powerpoint/2010/main" val="424713376"/>
       </p:ext>
     </p:extLst>
   </p:cSld>
@@ -7735,29 +8966,69 @@
       </p:grpSpPr>
       <p:sp>
         <p:nvSpPr>
-          <p:cNvPr id="2" name="TextBox 1"/>
-          <p:cNvSpPr txBox="1"/>
-          <p:nvPr/>
-        </p:nvSpPr>
-        <p:spPr>
-          <a:xfrm>
-            <a:off x="3544389" y="2865120"/>
-            <a:ext cx="4385368" cy="1200329"/>
-          </a:xfrm>
-          <a:prstGeom prst="rect">
-            <a:avLst/>
-          </a:prstGeom>
-          <a:noFill/>
-        </p:spPr>
-        <p:txBody>
-          <a:bodyPr wrap="none" rtlCol="0">
-            <a:spAutoFit/>
-          </a:bodyPr>
-          <a:lstStyle/>
-          <a:p>
-            <a:r>
-              <a:rPr lang="en-US" sz="7200" dirty="0"/>
-              <a:t>Questions?</a:t>
+          <p:cNvPr id="2" name="Title 1"/>
+          <p:cNvSpPr>
+            <a:spLocks noGrp="1"/>
+          </p:cNvSpPr>
+          <p:nvPr>
+            <p:ph type="title"/>
+          </p:nvPr>
+        </p:nvSpPr>
+        <p:spPr/>
+        <p:txBody>
+          <a:bodyPr/>
+          <a:lstStyle/>
+          <a:p>
+            <a:r>
+              <a:rPr lang="en-US" dirty="0"/>
+              <a:t>Improvements</a:t>
+            </a:r>
+          </a:p>
+        </p:txBody>
+      </p:sp>
+      <p:sp>
+        <p:nvSpPr>
+          <p:cNvPr id="3" name="Content Placeholder 2"/>
+          <p:cNvSpPr>
+            <a:spLocks noGrp="1"/>
+          </p:cNvSpPr>
+          <p:nvPr>
+            <p:ph idx="1"/>
+          </p:nvPr>
+        </p:nvSpPr>
+        <p:spPr/>
+        <p:txBody>
+          <a:bodyPr/>
+          <a:lstStyle/>
+          <a:p>
+            <a:r>
+              <a:rPr lang="en-US" dirty="0"/>
+              <a:t>Materials for the substrate and the film material could be specified.</a:t>
+            </a:r>
+          </a:p>
+          <a:p>
+            <a:pPr lvl="1"/>
+            <a:r>
+              <a:rPr lang="en-US" dirty="0"/>
+              <a:t>Using this, precise calculations could be made for deposition rate, desorption rate, surface diffusion, and critical cluster size</a:t>
+            </a:r>
+          </a:p>
+          <a:p>
+            <a:r>
+              <a:rPr lang="en-US" dirty="0"/>
+              <a:t>Common material configurations can be provided and chosen by the user to provide the values for the above calculations.</a:t>
+            </a:r>
+          </a:p>
+          <a:p>
+            <a:r>
+              <a:rPr lang="en-US" dirty="0"/>
+              <a:t>Different lattice configurations of the substrate can be taken into account.</a:t>
+            </a:r>
+          </a:p>
+          <a:p>
+            <a:r>
+              <a:rPr lang="en-US" dirty="0"/>
+              <a:t>Different colors for the substrate and the film material could be picked</a:t>
             </a:r>
           </a:p>
         </p:txBody>
@@ -7765,7 +9036,7 @@
     </p:spTree>
     <p:extLst>
       <p:ext uri="{BB962C8B-B14F-4D97-AF65-F5344CB8AC3E}">
-        <p14:creationId xmlns:p14="http://schemas.microsoft.com/office/powerpoint/2010/main" val="654456828"/>
+        <p14:creationId xmlns:p14="http://schemas.microsoft.com/office/powerpoint/2010/main" val="1689718019"/>
       </p:ext>
     </p:extLst>
   </p:cSld>
@@ -7904,7 +9175,7 @@
         </p:blipFill>
         <p:spPr>
           <a:xfrm>
-            <a:off x="6248579" y="3648630"/>
+            <a:off x="5865402" y="3192031"/>
             <a:ext cx="4749206" cy="647619"/>
           </a:xfrm>
           <a:prstGeom prst="rect">
@@ -7955,6 +9226,65 @@
 </p:sld>
 </file>
 
+<file path=ppt/slides/slide20.xml><?xml version="1.0" encoding="utf-8"?>
+<p:sld xmlns:a="http://schemas.openxmlformats.org/drawingml/2006/main" xmlns:r="http://schemas.openxmlformats.org/officeDocument/2006/relationships" xmlns:p="http://schemas.openxmlformats.org/presentationml/2006/main">
+  <p:cSld>
+    <p:spTree>
+      <p:nvGrpSpPr>
+        <p:cNvPr id="1" name=""/>
+        <p:cNvGrpSpPr/>
+        <p:nvPr/>
+      </p:nvGrpSpPr>
+      <p:grpSpPr>
+        <a:xfrm>
+          <a:off x="0" y="0"/>
+          <a:ext cx="0" cy="0"/>
+          <a:chOff x="0" y="0"/>
+          <a:chExt cx="0" cy="0"/>
+        </a:xfrm>
+      </p:grpSpPr>
+      <p:sp>
+        <p:nvSpPr>
+          <p:cNvPr id="2" name="TextBox 1"/>
+          <p:cNvSpPr txBox="1"/>
+          <p:nvPr/>
+        </p:nvSpPr>
+        <p:spPr>
+          <a:xfrm>
+            <a:off x="3544389" y="2865120"/>
+            <a:ext cx="4385368" cy="1200329"/>
+          </a:xfrm>
+          <a:prstGeom prst="rect">
+            <a:avLst/>
+          </a:prstGeom>
+          <a:noFill/>
+        </p:spPr>
+        <p:txBody>
+          <a:bodyPr wrap="none" rtlCol="0">
+            <a:spAutoFit/>
+          </a:bodyPr>
+          <a:lstStyle/>
+          <a:p>
+            <a:r>
+              <a:rPr lang="en-US" sz="7200" dirty="0"/>
+              <a:t>Questions?</a:t>
+            </a:r>
+          </a:p>
+        </p:txBody>
+      </p:sp>
+    </p:spTree>
+    <p:extLst>
+      <p:ext uri="{BB962C8B-B14F-4D97-AF65-F5344CB8AC3E}">
+        <p14:creationId xmlns:p14="http://schemas.microsoft.com/office/powerpoint/2010/main" val="654456828"/>
+      </p:ext>
+    </p:extLst>
+  </p:cSld>
+  <p:clrMapOvr>
+    <a:masterClrMapping/>
+  </p:clrMapOvr>
+</p:sld>
+</file>
+
 <file path=ppt/slides/slide3.xml><?xml version="1.0" encoding="utf-8"?>
 <p:sld xmlns:a="http://schemas.openxmlformats.org/drawingml/2006/main" xmlns:r="http://schemas.openxmlformats.org/officeDocument/2006/relationships" xmlns:p="http://schemas.openxmlformats.org/presentationml/2006/main">
   <p:cSld>
@@ -8045,22 +9375,15 @@
           </a:p>
           <a:p>
             <a:r>
-              <a:rPr lang="en-US">
+              <a:rPr lang="en-US" dirty="0">
                 <a:hlinkClick r:id="rId2"/>
               </a:rPr>
-              <a:t>https</a:t>
-            </a:r>
-            <a:r>
-              <a:rPr lang="en-US">
-                <a:hlinkClick r:id="rId2"/>
-              </a:rPr>
-              <a:t>://github.com/marklwatson/nucleation</a:t>
-            </a:r>
-            <a:r>
-              <a:rPr lang="en-US"/>
+              <a:t>https://github.com/marklwatson/nucleation</a:t>
+            </a:r>
+            <a:r>
+              <a:rPr lang="en-US" dirty="0"/>
               <a:t> </a:t>
             </a:r>
-            <a:endParaRPr lang="en-US" dirty="0"/>
           </a:p>
         </p:txBody>
       </p:sp>
@@ -8557,46 +9880,6 @@
       </p:grpSpPr>
       <p:sp>
         <p:nvSpPr>
-          <p:cNvPr id="28" name="Rectangle 27"/>
-          <p:cNvSpPr/>
-          <p:nvPr/>
-        </p:nvSpPr>
-        <p:spPr>
-          <a:xfrm>
-            <a:off x="1715588" y="1613875"/>
-            <a:ext cx="9283337" cy="4743381"/>
-          </a:xfrm>
-          <a:prstGeom prst="rect">
-            <a:avLst/>
-          </a:prstGeom>
-        </p:spPr>
-        <p:style>
-          <a:lnRef idx="2">
-            <a:schemeClr val="accent2">
-              <a:shade val="50000"/>
-            </a:schemeClr>
-          </a:lnRef>
-          <a:fillRef idx="1">
-            <a:schemeClr val="accent2"/>
-          </a:fillRef>
-          <a:effectRef idx="0">
-            <a:schemeClr val="accent2"/>
-          </a:effectRef>
-          <a:fontRef idx="minor">
-            <a:schemeClr val="lt1"/>
-          </a:fontRef>
-        </p:style>
-        <p:txBody>
-          <a:bodyPr rtlCol="0" anchor="ctr"/>
-          <a:lstStyle/>
-          <a:p>
-            <a:pPr algn="ctr"/>
-            <a:endParaRPr lang="en-US"/>
-          </a:p>
-        </p:txBody>
-      </p:sp>
-      <p:sp>
-        <p:nvSpPr>
           <p:cNvPr id="2" name="Title 1"/>
           <p:cNvSpPr>
             <a:spLocks noGrp="1"/>
@@ -8612,1114 +9895,55 @@
           <a:p>
             <a:r>
               <a:rPr lang="en-US" dirty="0"/>
-              <a:t>Software Design: Objects</a:t>
-            </a:r>
-          </a:p>
-        </p:txBody>
-      </p:sp>
-      <p:sp>
-        <p:nvSpPr>
-          <p:cNvPr id="4" name="Flowchart: Connector 3"/>
-          <p:cNvSpPr/>
-          <p:nvPr/>
-        </p:nvSpPr>
-        <p:spPr>
-          <a:xfrm>
-            <a:off x="3477395" y="3325112"/>
-            <a:ext cx="457200" cy="457200"/>
-          </a:xfrm>
-          <a:prstGeom prst="flowChartConnector">
-            <a:avLst/>
-          </a:prstGeom>
-        </p:spPr>
-        <p:style>
-          <a:lnRef idx="2">
-            <a:schemeClr val="accent1">
-              <a:shade val="50000"/>
-            </a:schemeClr>
-          </a:lnRef>
-          <a:fillRef idx="1">
-            <a:schemeClr val="accent1"/>
-          </a:fillRef>
-          <a:effectRef idx="0">
-            <a:schemeClr val="accent1"/>
-          </a:effectRef>
-          <a:fontRef idx="minor">
-            <a:schemeClr val="lt1"/>
-          </a:fontRef>
-        </p:style>
-        <p:txBody>
-          <a:bodyPr rtlCol="0" anchor="ctr"/>
-          <a:lstStyle/>
-          <a:p>
-            <a:pPr algn="ctr"/>
-            <a:endParaRPr lang="en-US"/>
-          </a:p>
-        </p:txBody>
-      </p:sp>
-      <p:sp>
-        <p:nvSpPr>
-          <p:cNvPr id="5" name="Flowchart: Connector 4"/>
-          <p:cNvSpPr/>
-          <p:nvPr/>
-        </p:nvSpPr>
-        <p:spPr>
-          <a:xfrm>
-            <a:off x="7180218" y="3409407"/>
-            <a:ext cx="457200" cy="457200"/>
-          </a:xfrm>
-          <a:prstGeom prst="flowChartConnector">
-            <a:avLst/>
-          </a:prstGeom>
-        </p:spPr>
-        <p:style>
-          <a:lnRef idx="2">
-            <a:schemeClr val="accent1">
-              <a:shade val="50000"/>
-            </a:schemeClr>
-          </a:lnRef>
-          <a:fillRef idx="1">
-            <a:schemeClr val="accent1"/>
-          </a:fillRef>
-          <a:effectRef idx="0">
-            <a:schemeClr val="accent1"/>
-          </a:effectRef>
-          <a:fontRef idx="minor">
-            <a:schemeClr val="lt1"/>
-          </a:fontRef>
-        </p:style>
-        <p:txBody>
-          <a:bodyPr rtlCol="0" anchor="ctr"/>
-          <a:lstStyle/>
-          <a:p>
-            <a:pPr algn="ctr"/>
-            <a:endParaRPr lang="en-US"/>
-          </a:p>
-        </p:txBody>
-      </p:sp>
-      <p:sp>
-        <p:nvSpPr>
-          <p:cNvPr id="6" name="Flowchart: Connector 5"/>
-          <p:cNvSpPr/>
-          <p:nvPr/>
-        </p:nvSpPr>
-        <p:spPr>
-          <a:xfrm>
-            <a:off x="7559041" y="3063854"/>
-            <a:ext cx="457200" cy="457200"/>
-          </a:xfrm>
-          <a:prstGeom prst="flowChartConnector">
-            <a:avLst/>
-          </a:prstGeom>
-        </p:spPr>
-        <p:style>
-          <a:lnRef idx="2">
-            <a:schemeClr val="accent1">
-              <a:shade val="50000"/>
-            </a:schemeClr>
-          </a:lnRef>
-          <a:fillRef idx="1">
-            <a:schemeClr val="accent1"/>
-          </a:fillRef>
-          <a:effectRef idx="0">
-            <a:schemeClr val="accent1"/>
-          </a:effectRef>
-          <a:fontRef idx="minor">
-            <a:schemeClr val="lt1"/>
-          </a:fontRef>
-        </p:style>
-        <p:txBody>
-          <a:bodyPr rtlCol="0" anchor="ctr"/>
-          <a:lstStyle/>
-          <a:p>
-            <a:pPr algn="ctr"/>
-            <a:endParaRPr lang="en-US"/>
-          </a:p>
-        </p:txBody>
-      </p:sp>
-      <p:sp>
-        <p:nvSpPr>
-          <p:cNvPr id="7" name="Flowchart: Connector 6"/>
-          <p:cNvSpPr/>
-          <p:nvPr/>
-        </p:nvSpPr>
-        <p:spPr>
-          <a:xfrm>
-            <a:off x="7637418" y="3553712"/>
-            <a:ext cx="457200" cy="457200"/>
-          </a:xfrm>
-          <a:prstGeom prst="flowChartConnector">
-            <a:avLst/>
-          </a:prstGeom>
-        </p:spPr>
-        <p:style>
-          <a:lnRef idx="2">
-            <a:schemeClr val="accent1">
-              <a:shade val="50000"/>
-            </a:schemeClr>
-          </a:lnRef>
-          <a:fillRef idx="1">
-            <a:schemeClr val="accent1"/>
-          </a:fillRef>
-          <a:effectRef idx="0">
-            <a:schemeClr val="accent1"/>
-          </a:effectRef>
-          <a:fontRef idx="minor">
-            <a:schemeClr val="lt1"/>
-          </a:fontRef>
-        </p:style>
-        <p:txBody>
-          <a:bodyPr rtlCol="0" anchor="ctr"/>
-          <a:lstStyle/>
-          <a:p>
-            <a:pPr algn="ctr"/>
-            <a:endParaRPr lang="en-US"/>
-          </a:p>
-        </p:txBody>
-      </p:sp>
-      <p:sp>
-        <p:nvSpPr>
-          <p:cNvPr id="8" name="Flowchart: Connector 7"/>
-          <p:cNvSpPr/>
-          <p:nvPr/>
-        </p:nvSpPr>
-        <p:spPr>
-          <a:xfrm>
-            <a:off x="8016241" y="3281570"/>
-            <a:ext cx="457200" cy="457200"/>
-          </a:xfrm>
-          <a:prstGeom prst="flowChartConnector">
-            <a:avLst/>
-          </a:prstGeom>
-        </p:spPr>
-        <p:style>
-          <a:lnRef idx="2">
-            <a:schemeClr val="accent1">
-              <a:shade val="50000"/>
-            </a:schemeClr>
-          </a:lnRef>
-          <a:fillRef idx="1">
-            <a:schemeClr val="accent1"/>
-          </a:fillRef>
-          <a:effectRef idx="0">
-            <a:schemeClr val="accent1"/>
-          </a:effectRef>
-          <a:fontRef idx="minor">
-            <a:schemeClr val="lt1"/>
-          </a:fontRef>
-        </p:style>
-        <p:txBody>
-          <a:bodyPr rtlCol="0" anchor="ctr"/>
-          <a:lstStyle/>
-          <a:p>
-            <a:pPr algn="ctr"/>
-            <a:endParaRPr lang="en-US"/>
-          </a:p>
-        </p:txBody>
-      </p:sp>
-      <p:sp>
-        <p:nvSpPr>
-          <p:cNvPr id="9" name="Flowchart: Connector 8"/>
-          <p:cNvSpPr/>
-          <p:nvPr/>
-        </p:nvSpPr>
-        <p:spPr>
-          <a:xfrm>
-            <a:off x="8473441" y="3454793"/>
-            <a:ext cx="457200" cy="457200"/>
-          </a:xfrm>
-          <a:prstGeom prst="flowChartConnector">
-            <a:avLst/>
-          </a:prstGeom>
-        </p:spPr>
-        <p:style>
-          <a:lnRef idx="2">
-            <a:schemeClr val="accent1">
-              <a:shade val="50000"/>
-            </a:schemeClr>
-          </a:lnRef>
-          <a:fillRef idx="1">
-            <a:schemeClr val="accent1"/>
-          </a:fillRef>
-          <a:effectRef idx="0">
-            <a:schemeClr val="accent1"/>
-          </a:effectRef>
-          <a:fontRef idx="minor">
-            <a:schemeClr val="lt1"/>
-          </a:fontRef>
-        </p:style>
-        <p:txBody>
-          <a:bodyPr rtlCol="0" anchor="ctr"/>
-          <a:lstStyle/>
-          <a:p>
-            <a:pPr algn="ctr"/>
-            <a:endParaRPr lang="en-US"/>
-          </a:p>
-        </p:txBody>
-      </p:sp>
-      <p:sp>
-        <p:nvSpPr>
-          <p:cNvPr id="10" name="Flowchart: Connector 9"/>
-          <p:cNvSpPr/>
-          <p:nvPr/>
-        </p:nvSpPr>
-        <p:spPr>
-          <a:xfrm>
-            <a:off x="8512629" y="3989631"/>
-            <a:ext cx="457200" cy="457200"/>
-          </a:xfrm>
-          <a:prstGeom prst="flowChartConnector">
-            <a:avLst/>
-          </a:prstGeom>
-        </p:spPr>
-        <p:style>
-          <a:lnRef idx="2">
-            <a:schemeClr val="accent1">
-              <a:shade val="50000"/>
-            </a:schemeClr>
-          </a:lnRef>
-          <a:fillRef idx="1">
-            <a:schemeClr val="accent1"/>
-          </a:fillRef>
-          <a:effectRef idx="0">
-            <a:schemeClr val="accent1"/>
-          </a:effectRef>
-          <a:fontRef idx="minor">
-            <a:schemeClr val="lt1"/>
-          </a:fontRef>
-        </p:style>
-        <p:txBody>
-          <a:bodyPr rtlCol="0" anchor="ctr"/>
-          <a:lstStyle/>
-          <a:p>
-            <a:pPr algn="ctr"/>
-            <a:endParaRPr lang="en-US"/>
-          </a:p>
-        </p:txBody>
-      </p:sp>
-      <p:sp>
-        <p:nvSpPr>
-          <p:cNvPr id="11" name="Flowchart: Connector 10"/>
-          <p:cNvSpPr/>
-          <p:nvPr/>
-        </p:nvSpPr>
-        <p:spPr>
-          <a:xfrm>
-            <a:off x="8122923" y="4296164"/>
-            <a:ext cx="457200" cy="457200"/>
-          </a:xfrm>
-          <a:prstGeom prst="flowChartConnector">
-            <a:avLst/>
-          </a:prstGeom>
-        </p:spPr>
-        <p:style>
-          <a:lnRef idx="2">
-            <a:schemeClr val="accent1">
-              <a:shade val="50000"/>
-            </a:schemeClr>
-          </a:lnRef>
-          <a:fillRef idx="1">
-            <a:schemeClr val="accent1"/>
-          </a:fillRef>
-          <a:effectRef idx="0">
-            <a:schemeClr val="accent1"/>
-          </a:effectRef>
-          <a:fontRef idx="minor">
-            <a:schemeClr val="lt1"/>
-          </a:fontRef>
-        </p:style>
-        <p:txBody>
-          <a:bodyPr rtlCol="0" anchor="ctr"/>
-          <a:lstStyle/>
-          <a:p>
-            <a:pPr algn="ctr"/>
-            <a:endParaRPr lang="en-US"/>
-          </a:p>
-        </p:txBody>
-      </p:sp>
-      <p:sp>
-        <p:nvSpPr>
-          <p:cNvPr id="12" name="Flowchart: Connector 11"/>
-          <p:cNvSpPr/>
-          <p:nvPr/>
-        </p:nvSpPr>
-        <p:spPr>
-          <a:xfrm>
-            <a:off x="8094618" y="3755261"/>
-            <a:ext cx="457200" cy="457200"/>
-          </a:xfrm>
-          <a:prstGeom prst="flowChartConnector">
-            <a:avLst/>
-          </a:prstGeom>
-        </p:spPr>
-        <p:style>
-          <a:lnRef idx="2">
-            <a:schemeClr val="accent1">
-              <a:shade val="50000"/>
-            </a:schemeClr>
-          </a:lnRef>
-          <a:fillRef idx="1">
-            <a:schemeClr val="accent1"/>
-          </a:fillRef>
-          <a:effectRef idx="0">
-            <a:schemeClr val="accent1"/>
-          </a:effectRef>
-          <a:fontRef idx="minor">
-            <a:schemeClr val="lt1"/>
-          </a:fontRef>
-        </p:style>
-        <p:txBody>
-          <a:bodyPr rtlCol="0" anchor="ctr"/>
-          <a:lstStyle/>
-          <a:p>
-            <a:pPr algn="ctr"/>
-            <a:endParaRPr lang="en-US"/>
-          </a:p>
-        </p:txBody>
-      </p:sp>
-      <p:sp>
-        <p:nvSpPr>
-          <p:cNvPr id="13" name="Flowchart: Connector 12"/>
-          <p:cNvSpPr/>
-          <p:nvPr/>
-        </p:nvSpPr>
-        <p:spPr>
-          <a:xfrm>
-            <a:off x="7715795" y="4039238"/>
-            <a:ext cx="457200" cy="457200"/>
-          </a:xfrm>
-          <a:prstGeom prst="flowChartConnector">
-            <a:avLst/>
-          </a:prstGeom>
-        </p:spPr>
-        <p:style>
-          <a:lnRef idx="2">
-            <a:schemeClr val="accent1">
-              <a:shade val="50000"/>
-            </a:schemeClr>
-          </a:lnRef>
-          <a:fillRef idx="1">
-            <a:schemeClr val="accent1"/>
-          </a:fillRef>
-          <a:effectRef idx="0">
-            <a:schemeClr val="accent1"/>
-          </a:effectRef>
-          <a:fontRef idx="minor">
-            <a:schemeClr val="lt1"/>
-          </a:fontRef>
-        </p:style>
-        <p:txBody>
-          <a:bodyPr rtlCol="0" anchor="ctr"/>
-          <a:lstStyle/>
-          <a:p>
-            <a:pPr algn="ctr"/>
-            <a:endParaRPr lang="en-US"/>
-          </a:p>
-        </p:txBody>
-      </p:sp>
-      <p:sp>
-        <p:nvSpPr>
-          <p:cNvPr id="14" name="Flowchart: Connector 13"/>
-          <p:cNvSpPr/>
-          <p:nvPr/>
-        </p:nvSpPr>
-        <p:spPr>
-          <a:xfrm>
-            <a:off x="7258595" y="3886822"/>
-            <a:ext cx="457200" cy="457200"/>
-          </a:xfrm>
-          <a:prstGeom prst="flowChartConnector">
-            <a:avLst/>
-          </a:prstGeom>
-        </p:spPr>
-        <p:style>
-          <a:lnRef idx="2">
-            <a:schemeClr val="accent1">
-              <a:shade val="50000"/>
-            </a:schemeClr>
-          </a:lnRef>
-          <a:fillRef idx="1">
-            <a:schemeClr val="accent1"/>
-          </a:fillRef>
-          <a:effectRef idx="0">
-            <a:schemeClr val="accent1"/>
-          </a:effectRef>
-          <a:fontRef idx="minor">
-            <a:schemeClr val="lt1"/>
-          </a:fontRef>
-        </p:style>
-        <p:txBody>
-          <a:bodyPr rtlCol="0" anchor="ctr"/>
-          <a:lstStyle/>
-          <a:p>
-            <a:pPr algn="ctr"/>
-            <a:endParaRPr lang="en-US"/>
-          </a:p>
-        </p:txBody>
-      </p:sp>
-      <p:sp>
-        <p:nvSpPr>
-          <p:cNvPr id="15" name="Flowchart: Connector 14"/>
-          <p:cNvSpPr/>
-          <p:nvPr/>
-        </p:nvSpPr>
-        <p:spPr>
-          <a:xfrm>
-            <a:off x="7676607" y="4499844"/>
-            <a:ext cx="457200" cy="457200"/>
-          </a:xfrm>
-          <a:prstGeom prst="flowChartConnector">
-            <a:avLst/>
-          </a:prstGeom>
-        </p:spPr>
-        <p:style>
-          <a:lnRef idx="2">
-            <a:schemeClr val="accent1">
-              <a:shade val="50000"/>
-            </a:schemeClr>
-          </a:lnRef>
-          <a:fillRef idx="1">
-            <a:schemeClr val="accent1"/>
-          </a:fillRef>
-          <a:effectRef idx="0">
-            <a:schemeClr val="accent1"/>
-          </a:effectRef>
-          <a:fontRef idx="minor">
-            <a:schemeClr val="lt1"/>
-          </a:fontRef>
-        </p:style>
-        <p:txBody>
-          <a:bodyPr rtlCol="0" anchor="ctr"/>
-          <a:lstStyle/>
-          <a:p>
-            <a:pPr algn="ctr"/>
-            <a:endParaRPr lang="en-US"/>
-          </a:p>
-        </p:txBody>
-      </p:sp>
-      <p:sp>
-        <p:nvSpPr>
-          <p:cNvPr id="16" name="Flowchart: Connector 15"/>
-          <p:cNvSpPr/>
-          <p:nvPr/>
-        </p:nvSpPr>
-        <p:spPr>
-          <a:xfrm>
-            <a:off x="7215054" y="4357706"/>
-            <a:ext cx="457200" cy="457200"/>
-          </a:xfrm>
-          <a:prstGeom prst="flowChartConnector">
-            <a:avLst/>
-          </a:prstGeom>
-        </p:spPr>
-        <p:style>
-          <a:lnRef idx="2">
-            <a:schemeClr val="accent1">
-              <a:shade val="50000"/>
-            </a:schemeClr>
-          </a:lnRef>
-          <a:fillRef idx="1">
-            <a:schemeClr val="accent1"/>
-          </a:fillRef>
-          <a:effectRef idx="0">
-            <a:schemeClr val="accent1"/>
-          </a:effectRef>
-          <a:fontRef idx="minor">
-            <a:schemeClr val="lt1"/>
-          </a:fontRef>
-        </p:style>
-        <p:txBody>
-          <a:bodyPr rtlCol="0" anchor="ctr"/>
-          <a:lstStyle/>
-          <a:p>
-            <a:pPr algn="ctr"/>
-            <a:endParaRPr lang="en-US"/>
-          </a:p>
-        </p:txBody>
-      </p:sp>
-      <p:sp>
-        <p:nvSpPr>
-          <p:cNvPr id="17" name="Flowchart: Connector 16"/>
-          <p:cNvSpPr/>
-          <p:nvPr/>
-        </p:nvSpPr>
-        <p:spPr>
-          <a:xfrm>
-            <a:off x="6816636" y="4083997"/>
-            <a:ext cx="457200" cy="457200"/>
-          </a:xfrm>
-          <a:prstGeom prst="flowChartConnector">
-            <a:avLst/>
-          </a:prstGeom>
-        </p:spPr>
-        <p:style>
-          <a:lnRef idx="2">
-            <a:schemeClr val="accent1">
-              <a:shade val="50000"/>
-            </a:schemeClr>
-          </a:lnRef>
-          <a:fillRef idx="1">
-            <a:schemeClr val="accent1"/>
-          </a:fillRef>
-          <a:effectRef idx="0">
-            <a:schemeClr val="accent1"/>
-          </a:effectRef>
-          <a:fontRef idx="minor">
-            <a:schemeClr val="lt1"/>
-          </a:fontRef>
-        </p:style>
-        <p:txBody>
-          <a:bodyPr rtlCol="0" anchor="ctr"/>
-          <a:lstStyle/>
-          <a:p>
-            <a:pPr algn="ctr"/>
-            <a:endParaRPr lang="en-US"/>
-          </a:p>
-        </p:txBody>
-      </p:sp>
-      <p:sp>
-        <p:nvSpPr>
-          <p:cNvPr id="18" name="Flowchart: Connector 17"/>
-          <p:cNvSpPr/>
-          <p:nvPr/>
-        </p:nvSpPr>
-        <p:spPr>
-          <a:xfrm>
-            <a:off x="6762207" y="3626797"/>
-            <a:ext cx="457200" cy="457200"/>
-          </a:xfrm>
-          <a:prstGeom prst="flowChartConnector">
-            <a:avLst/>
-          </a:prstGeom>
-        </p:spPr>
-        <p:style>
-          <a:lnRef idx="2">
-            <a:schemeClr val="accent1">
-              <a:shade val="50000"/>
-            </a:schemeClr>
-          </a:lnRef>
-          <a:fillRef idx="1">
-            <a:schemeClr val="accent1"/>
-          </a:fillRef>
-          <a:effectRef idx="0">
-            <a:schemeClr val="accent1"/>
-          </a:effectRef>
-          <a:fontRef idx="minor">
-            <a:schemeClr val="lt1"/>
-          </a:fontRef>
-        </p:style>
-        <p:txBody>
-          <a:bodyPr rtlCol="0" anchor="ctr"/>
-          <a:lstStyle/>
-          <a:p>
-            <a:pPr algn="ctr"/>
-            <a:endParaRPr lang="en-US"/>
-          </a:p>
-        </p:txBody>
-      </p:sp>
-      <p:sp>
-        <p:nvSpPr>
-          <p:cNvPr id="19" name="TextBox 18"/>
-          <p:cNvSpPr txBox="1"/>
-          <p:nvPr/>
-        </p:nvSpPr>
-        <p:spPr>
-          <a:xfrm>
-            <a:off x="3761111" y="2634005"/>
-            <a:ext cx="2461508" cy="523220"/>
-          </a:xfrm>
-          <a:prstGeom prst="rect">
-            <a:avLst/>
-          </a:prstGeom>
-          <a:noFill/>
-        </p:spPr>
-        <p:txBody>
-          <a:bodyPr wrap="none" rtlCol="0">
-            <a:spAutoFit/>
-          </a:bodyPr>
-          <a:lstStyle/>
-          <a:p>
-            <a:r>
-              <a:rPr lang="en-US" sz="2800" dirty="0"/>
-              <a:t>Molecule/Atom</a:t>
-            </a:r>
-          </a:p>
-        </p:txBody>
-      </p:sp>
-      <p:sp>
-        <p:nvSpPr>
-          <p:cNvPr id="20" name="TextBox 19"/>
-          <p:cNvSpPr txBox="1"/>
-          <p:nvPr/>
-        </p:nvSpPr>
-        <p:spPr>
-          <a:xfrm>
-            <a:off x="8351523" y="2600300"/>
-            <a:ext cx="1202702" cy="523220"/>
-          </a:xfrm>
-          <a:prstGeom prst="rect">
-            <a:avLst/>
-          </a:prstGeom>
-          <a:noFill/>
-        </p:spPr>
-        <p:txBody>
-          <a:bodyPr wrap="none" rtlCol="0">
-            <a:spAutoFit/>
-          </a:bodyPr>
-          <a:lstStyle/>
-          <a:p>
-            <a:r>
-              <a:rPr lang="en-US" sz="2800" dirty="0"/>
-              <a:t>Cluster</a:t>
-            </a:r>
-          </a:p>
-        </p:txBody>
-      </p:sp>
-      <p:cxnSp>
-        <p:nvCxnSpPr>
-          <p:cNvPr id="22" name="Straight Arrow Connector 21"/>
-          <p:cNvCxnSpPr/>
-          <p:nvPr/>
-        </p:nvCxnSpPr>
-        <p:spPr>
-          <a:xfrm flipV="1">
-            <a:off x="3705995" y="3550917"/>
-            <a:ext cx="228600" cy="6221"/>
-          </a:xfrm>
-          <a:prstGeom prst="straightConnector1">
-            <a:avLst/>
-          </a:prstGeom>
-          <a:ln>
-            <a:tailEnd type="triangle"/>
-          </a:ln>
-        </p:spPr>
-        <p:style>
-          <a:lnRef idx="1">
-            <a:schemeClr val="dk1"/>
-          </a:lnRef>
-          <a:fillRef idx="0">
-            <a:schemeClr val="dk1"/>
-          </a:fillRef>
-          <a:effectRef idx="0">
-            <a:schemeClr val="dk1"/>
-          </a:effectRef>
-          <a:fontRef idx="minor">
-            <a:schemeClr val="tx1"/>
-          </a:fontRef>
-        </p:style>
-      </p:cxnSp>
-      <p:cxnSp>
-        <p:nvCxnSpPr>
-          <p:cNvPr id="24" name="Straight Arrow Connector 23"/>
-          <p:cNvCxnSpPr/>
-          <p:nvPr/>
-        </p:nvCxnSpPr>
-        <p:spPr>
-          <a:xfrm flipV="1">
-            <a:off x="7847973" y="4009505"/>
-            <a:ext cx="1121856" cy="12460"/>
-          </a:xfrm>
-          <a:prstGeom prst="straightConnector1">
-            <a:avLst/>
-          </a:prstGeom>
-          <a:ln>
-            <a:tailEnd type="triangle"/>
-          </a:ln>
-        </p:spPr>
-        <p:style>
-          <a:lnRef idx="1">
-            <a:schemeClr val="dk1"/>
-          </a:lnRef>
-          <a:fillRef idx="0">
-            <a:schemeClr val="dk1"/>
-          </a:fillRef>
-          <a:effectRef idx="0">
-            <a:schemeClr val="dk1"/>
-          </a:effectRef>
-          <a:fontRef idx="minor">
-            <a:schemeClr val="tx1"/>
-          </a:fontRef>
-        </p:style>
-      </p:cxnSp>
-      <p:sp>
-        <p:nvSpPr>
-          <p:cNvPr id="26" name="TextBox 25"/>
-          <p:cNvSpPr txBox="1"/>
-          <p:nvPr/>
-        </p:nvSpPr>
-        <p:spPr>
-          <a:xfrm>
-            <a:off x="3669779" y="3270127"/>
-            <a:ext cx="264816" cy="369332"/>
-          </a:xfrm>
-          <a:prstGeom prst="rect">
-            <a:avLst/>
-          </a:prstGeom>
-          <a:noFill/>
-        </p:spPr>
-        <p:txBody>
-          <a:bodyPr wrap="none" rtlCol="0">
-            <a:spAutoFit/>
-          </a:bodyPr>
+              <a:t>Inputs</a:t>
+            </a:r>
+          </a:p>
+        </p:txBody>
+      </p:sp>
+      <p:sp>
+        <p:nvSpPr>
+          <p:cNvPr id="3" name="Content Placeholder 2"/>
+          <p:cNvSpPr>
+            <a:spLocks noGrp="1"/>
+          </p:cNvSpPr>
+          <p:nvPr>
+            <p:ph idx="1"/>
+          </p:nvPr>
+        </p:nvSpPr>
+        <p:spPr/>
+        <p:txBody>
+          <a:bodyPr/>
           <a:lstStyle/>
           <a:p>
             <a:r>
               <a:rPr lang="en-US" dirty="0"/>
-              <a:t>r</a:t>
-            </a:r>
-          </a:p>
-        </p:txBody>
-      </p:sp>
-      <p:sp>
-        <p:nvSpPr>
-          <p:cNvPr id="27" name="TextBox 26"/>
-          <p:cNvSpPr txBox="1"/>
-          <p:nvPr/>
-        </p:nvSpPr>
-        <p:spPr>
-          <a:xfrm>
-            <a:off x="8157754" y="3661270"/>
-            <a:ext cx="309700" cy="369332"/>
-          </a:xfrm>
-          <a:prstGeom prst="rect">
-            <a:avLst/>
-          </a:prstGeom>
-          <a:noFill/>
-        </p:spPr>
-        <p:txBody>
-          <a:bodyPr wrap="none" rtlCol="0">
-            <a:spAutoFit/>
-          </a:bodyPr>
-          <a:lstStyle/>
+              <a:t>Temperature</a:t>
+            </a:r>
+          </a:p>
+          <a:p>
+            <a:endParaRPr lang="en-US" dirty="0"/>
+          </a:p>
           <a:p>
             <a:r>
               <a:rPr lang="en-US" dirty="0"/>
-              <a:t>R</a:t>
-            </a:r>
-          </a:p>
-        </p:txBody>
-      </p:sp>
-      <p:sp>
-        <p:nvSpPr>
-          <p:cNvPr id="29" name="TextBox 28"/>
-          <p:cNvSpPr txBox="1"/>
-          <p:nvPr/>
-        </p:nvSpPr>
-        <p:spPr>
-          <a:xfrm>
-            <a:off x="2333439" y="5632565"/>
-            <a:ext cx="1563761" cy="523220"/>
-          </a:xfrm>
-          <a:prstGeom prst="rect">
-            <a:avLst/>
-          </a:prstGeom>
-          <a:noFill/>
-        </p:spPr>
-        <p:txBody>
-          <a:bodyPr wrap="none" rtlCol="0">
-            <a:spAutoFit/>
-          </a:bodyPr>
-          <a:lstStyle/>
-          <a:p>
-            <a:r>
-              <a:rPr lang="en-US" sz="2800" dirty="0"/>
-              <a:t>Substrate</a:t>
-            </a:r>
-          </a:p>
-        </p:txBody>
-      </p:sp>
-      <p:cxnSp>
-        <p:nvCxnSpPr>
-          <p:cNvPr id="31" name="Straight Arrow Connector 30"/>
-          <p:cNvCxnSpPr/>
-          <p:nvPr/>
-        </p:nvCxnSpPr>
-        <p:spPr>
-          <a:xfrm>
-            <a:off x="4035740" y="3523222"/>
-            <a:ext cx="358729" cy="10889"/>
-          </a:xfrm>
-          <a:prstGeom prst="straightConnector1">
-            <a:avLst/>
-          </a:prstGeom>
-          <a:ln>
-            <a:solidFill>
-              <a:srgbClr val="FF0000"/>
-            </a:solidFill>
-            <a:tailEnd type="triangle"/>
-          </a:ln>
-        </p:spPr>
-        <p:style>
-          <a:lnRef idx="2">
-            <a:schemeClr val="accent6"/>
-          </a:lnRef>
-          <a:fillRef idx="0">
-            <a:schemeClr val="accent6"/>
-          </a:fillRef>
-          <a:effectRef idx="1">
-            <a:schemeClr val="accent6"/>
-          </a:effectRef>
-          <a:fontRef idx="minor">
-            <a:schemeClr val="tx1"/>
-          </a:fontRef>
-        </p:style>
-      </p:cxnSp>
-      <p:cxnSp>
-        <p:nvCxnSpPr>
-          <p:cNvPr id="33" name="Straight Arrow Connector 32"/>
-          <p:cNvCxnSpPr/>
-          <p:nvPr/>
-        </p:nvCxnSpPr>
-        <p:spPr>
-          <a:xfrm>
-            <a:off x="3720333" y="3862641"/>
-            <a:ext cx="2672" cy="306188"/>
-          </a:xfrm>
-          <a:prstGeom prst="straightConnector1">
-            <a:avLst/>
-          </a:prstGeom>
-          <a:ln>
-            <a:solidFill>
-              <a:srgbClr val="FF0000"/>
-            </a:solidFill>
-            <a:tailEnd type="triangle"/>
-          </a:ln>
-        </p:spPr>
-        <p:style>
-          <a:lnRef idx="2">
-            <a:schemeClr val="accent6"/>
-          </a:lnRef>
-          <a:fillRef idx="0">
-            <a:schemeClr val="accent6"/>
-          </a:fillRef>
-          <a:effectRef idx="1">
-            <a:schemeClr val="accent6"/>
-          </a:effectRef>
-          <a:fontRef idx="minor">
-            <a:schemeClr val="tx1"/>
-          </a:fontRef>
-        </p:style>
-      </p:cxnSp>
-      <p:cxnSp>
-        <p:nvCxnSpPr>
-          <p:cNvPr id="35" name="Straight Arrow Connector 34"/>
-          <p:cNvCxnSpPr/>
-          <p:nvPr/>
-        </p:nvCxnSpPr>
-        <p:spPr>
-          <a:xfrm flipH="1" flipV="1">
-            <a:off x="2913861" y="3556113"/>
-            <a:ext cx="401043" cy="3193"/>
-          </a:xfrm>
-          <a:prstGeom prst="straightConnector1">
-            <a:avLst/>
-          </a:prstGeom>
-          <a:ln>
-            <a:solidFill>
-              <a:srgbClr val="FF0000"/>
-            </a:solidFill>
-            <a:tailEnd type="triangle"/>
-          </a:ln>
-        </p:spPr>
-        <p:style>
-          <a:lnRef idx="2">
-            <a:schemeClr val="accent6"/>
-          </a:lnRef>
-          <a:fillRef idx="0">
-            <a:schemeClr val="accent6"/>
-          </a:fillRef>
-          <a:effectRef idx="1">
-            <a:schemeClr val="accent6"/>
-          </a:effectRef>
-          <a:fontRef idx="minor">
-            <a:schemeClr val="tx1"/>
-          </a:fontRef>
-        </p:style>
-      </p:cxnSp>
-      <p:cxnSp>
-        <p:nvCxnSpPr>
-          <p:cNvPr id="36" name="Straight Arrow Connector 35"/>
-          <p:cNvCxnSpPr/>
-          <p:nvPr/>
-        </p:nvCxnSpPr>
-        <p:spPr>
-          <a:xfrm flipV="1">
-            <a:off x="3715481" y="2899984"/>
-            <a:ext cx="10111" cy="283864"/>
-          </a:xfrm>
-          <a:prstGeom prst="straightConnector1">
-            <a:avLst/>
-          </a:prstGeom>
-          <a:ln>
-            <a:solidFill>
-              <a:srgbClr val="FF0000"/>
-            </a:solidFill>
-            <a:tailEnd type="triangle"/>
-          </a:ln>
-        </p:spPr>
-        <p:style>
-          <a:lnRef idx="2">
-            <a:schemeClr val="accent6"/>
-          </a:lnRef>
-          <a:fillRef idx="0">
-            <a:schemeClr val="accent6"/>
-          </a:fillRef>
-          <a:effectRef idx="1">
-            <a:schemeClr val="accent6"/>
-          </a:effectRef>
-          <a:fontRef idx="minor">
-            <a:schemeClr val="tx1"/>
-          </a:fontRef>
-        </p:style>
-      </p:cxnSp>
-      <p:cxnSp>
-        <p:nvCxnSpPr>
-          <p:cNvPr id="42" name="Straight Arrow Connector 41"/>
-          <p:cNvCxnSpPr/>
-          <p:nvPr/>
-        </p:nvCxnSpPr>
-        <p:spPr>
-          <a:xfrm>
-            <a:off x="9161667" y="4040434"/>
-            <a:ext cx="358729" cy="10889"/>
-          </a:xfrm>
-          <a:prstGeom prst="straightConnector1">
-            <a:avLst/>
-          </a:prstGeom>
-          <a:ln>
-            <a:solidFill>
-              <a:srgbClr val="FF0000"/>
-            </a:solidFill>
-            <a:tailEnd type="triangle"/>
-          </a:ln>
-        </p:spPr>
-        <p:style>
-          <a:lnRef idx="2">
-            <a:schemeClr val="accent6"/>
-          </a:lnRef>
-          <a:fillRef idx="0">
-            <a:schemeClr val="accent6"/>
-          </a:fillRef>
-          <a:effectRef idx="1">
-            <a:schemeClr val="accent6"/>
-          </a:effectRef>
-          <a:fontRef idx="minor">
-            <a:schemeClr val="tx1"/>
-          </a:fontRef>
-        </p:style>
-      </p:cxnSp>
-      <p:cxnSp>
-        <p:nvCxnSpPr>
-          <p:cNvPr id="43" name="Straight Arrow Connector 42"/>
-          <p:cNvCxnSpPr/>
-          <p:nvPr/>
-        </p:nvCxnSpPr>
-        <p:spPr>
-          <a:xfrm>
-            <a:off x="7902535" y="5149011"/>
-            <a:ext cx="2672" cy="306188"/>
-          </a:xfrm>
-          <a:prstGeom prst="straightConnector1">
-            <a:avLst/>
-          </a:prstGeom>
-          <a:ln>
-            <a:solidFill>
-              <a:srgbClr val="FF0000"/>
-            </a:solidFill>
-            <a:tailEnd type="triangle"/>
-          </a:ln>
-        </p:spPr>
-        <p:style>
-          <a:lnRef idx="2">
-            <a:schemeClr val="accent6"/>
-          </a:lnRef>
-          <a:fillRef idx="0">
-            <a:schemeClr val="accent6"/>
-          </a:fillRef>
-          <a:effectRef idx="1">
-            <a:schemeClr val="accent6"/>
-          </a:effectRef>
-          <a:fontRef idx="minor">
-            <a:schemeClr val="tx1"/>
-          </a:fontRef>
-        </p:style>
-      </p:cxnSp>
-      <p:cxnSp>
-        <p:nvCxnSpPr>
-          <p:cNvPr id="44" name="Straight Arrow Connector 43"/>
-          <p:cNvCxnSpPr/>
-          <p:nvPr/>
-        </p:nvCxnSpPr>
-        <p:spPr>
-          <a:xfrm flipH="1" flipV="1">
-            <a:off x="6112377" y="4037641"/>
-            <a:ext cx="401043" cy="3193"/>
-          </a:xfrm>
-          <a:prstGeom prst="straightConnector1">
-            <a:avLst/>
-          </a:prstGeom>
-          <a:ln>
-            <a:solidFill>
-              <a:srgbClr val="FF0000"/>
-            </a:solidFill>
-            <a:tailEnd type="triangle"/>
-          </a:ln>
-        </p:spPr>
-        <p:style>
-          <a:lnRef idx="2">
-            <a:schemeClr val="accent6"/>
-          </a:lnRef>
-          <a:fillRef idx="0">
-            <a:schemeClr val="accent6"/>
-          </a:fillRef>
-          <a:effectRef idx="1">
-            <a:schemeClr val="accent6"/>
-          </a:effectRef>
-          <a:fontRef idx="minor">
-            <a:schemeClr val="tx1"/>
-          </a:fontRef>
-        </p:style>
-      </p:cxnSp>
-      <p:cxnSp>
-        <p:nvCxnSpPr>
-          <p:cNvPr id="45" name="Straight Arrow Connector 44"/>
-          <p:cNvCxnSpPr/>
-          <p:nvPr/>
-        </p:nvCxnSpPr>
-        <p:spPr>
-          <a:xfrm flipV="1">
-            <a:off x="7779708" y="2611751"/>
-            <a:ext cx="10111" cy="283864"/>
-          </a:xfrm>
-          <a:prstGeom prst="straightConnector1">
-            <a:avLst/>
-          </a:prstGeom>
-          <a:ln>
-            <a:solidFill>
-              <a:srgbClr val="FF0000"/>
-            </a:solidFill>
-            <a:tailEnd type="triangle"/>
-          </a:ln>
-        </p:spPr>
-        <p:style>
-          <a:lnRef idx="2">
-            <a:schemeClr val="accent6"/>
-          </a:lnRef>
-          <a:fillRef idx="0">
-            <a:schemeClr val="accent6"/>
-          </a:fillRef>
-          <a:effectRef idx="1">
-            <a:schemeClr val="accent6"/>
-          </a:effectRef>
-          <a:fontRef idx="minor">
-            <a:schemeClr val="tx1"/>
-          </a:fontRef>
-        </p:style>
-      </p:cxnSp>
+              <a:t>Pressure</a:t>
+            </a:r>
+          </a:p>
+          <a:p>
+            <a:endParaRPr lang="en-US" dirty="0"/>
+          </a:p>
+          <a:p>
+            <a:r>
+              <a:rPr lang="en-US" dirty="0"/>
+              <a:t>Critical Size of the Cluster</a:t>
+            </a:r>
+          </a:p>
+        </p:txBody>
+      </p:sp>
     </p:spTree>
     <p:extLst>
       <p:ext uri="{BB962C8B-B14F-4D97-AF65-F5344CB8AC3E}">
-        <p14:creationId xmlns:p14="http://schemas.microsoft.com/office/powerpoint/2010/main" val="220388363"/>
+        <p14:creationId xmlns:p14="http://schemas.microsoft.com/office/powerpoint/2010/main" val="195308665"/>
       </p:ext>
     </p:extLst>
   </p:cSld>

</xml_diff>